<commit_message>
Created Geographic English Group and Started on Geographic Thai Group. Added buttons to switch language. And added Image Visual for Background not used Canvas Background as with an Image I can Change the image used as the background when I use a bookmark. It wil need testing to see what the performance like as I'm going to have a lot of visuals on the one page.
</commit_message>
<xml_diff>
--- a/Background/Backgrounds for Report.pptx
+++ b/Background/Backgrounds for Report.pptx
@@ -104,26 +104,47 @@
       </a:defRPr>
     </a:lvl9pPr>
   </p:defaultTextStyle>
+  <p:extLst>
+    <p:ext uri="{EFAFB233-063F-42B5-8137-9DF3F51BA10A}">
+      <p15:sldGuideLst xmlns:p15="http://schemas.microsoft.com/office/powerpoint/2012/main"/>
+    </p:ext>
+  </p:extLst>
 </p:presentation>
+</file>
+
+<file path=ppt/revisionInfo.xml><?xml version="1.0" encoding="utf-8"?>
+<p1510:revInfo xmlns:a="http://schemas.openxmlformats.org/drawingml/2006/main" xmlns:r="http://schemas.openxmlformats.org/officeDocument/2006/relationships" xmlns:p1510="http://schemas.microsoft.com/office/powerpoint/2015/10/main">
+  <p1510:revLst>
+    <p1510:client id="{BD549498-3C09-4EB4-B4FE-2C5D88A772BF}" v="15" dt="2023-07-28T09:18:33.485"/>
+  </p1510:revLst>
+</p1510:revInfo>
 </file>
 
 <file path=ppt/changesInfos/changesInfo1.xml><?xml version="1.0" encoding="utf-8"?>
 <pc:chgInfo xmlns:a="http://schemas.openxmlformats.org/drawingml/2006/main" xmlns:r="http://schemas.openxmlformats.org/officeDocument/2006/relationships" xmlns:ac="http://schemas.microsoft.com/office/drawing/2013/main/command" xmlns:pc="http://schemas.microsoft.com/office/powerpoint/2013/main/command">
   <pc:docChgLst>
     <pc:chgData name="Andrew Hubbard" userId="efcfa07183130be2" providerId="LiveId" clId="{BD549498-3C09-4EB4-B4FE-2C5D88A772BF}"/>
-    <pc:docChg chg="modSld">
-      <pc:chgData name="Andrew Hubbard" userId="efcfa07183130be2" providerId="LiveId" clId="{BD549498-3C09-4EB4-B4FE-2C5D88A772BF}" dt="2023-07-26T01:33:39.494" v="41" actId="14100"/>
+    <pc:docChg chg="undo custSel modSld">
+      <pc:chgData name="Andrew Hubbard" userId="efcfa07183130be2" providerId="LiveId" clId="{BD549498-3C09-4EB4-B4FE-2C5D88A772BF}" dt="2023-07-28T09:18:35.120" v="184" actId="478"/>
       <pc:docMkLst>
         <pc:docMk/>
       </pc:docMkLst>
-      <pc:sldChg chg="modSp mod">
-        <pc:chgData name="Andrew Hubbard" userId="efcfa07183130be2" providerId="LiveId" clId="{BD549498-3C09-4EB4-B4FE-2C5D88A772BF}" dt="2023-07-26T01:33:39.494" v="41" actId="14100"/>
+      <pc:sldChg chg="addSp delSp modSp mod">
+        <pc:chgData name="Andrew Hubbard" userId="efcfa07183130be2" providerId="LiveId" clId="{BD549498-3C09-4EB4-B4FE-2C5D88A772BF}" dt="2023-07-28T09:18:35.120" v="184" actId="478"/>
         <pc:sldMkLst>
           <pc:docMk/>
           <pc:sldMk cId="1767767614" sldId="256"/>
         </pc:sldMkLst>
+        <pc:spChg chg="add del mod ord">
+          <ac:chgData name="Andrew Hubbard" userId="efcfa07183130be2" providerId="LiveId" clId="{BD549498-3C09-4EB4-B4FE-2C5D88A772BF}" dt="2023-07-28T09:18:35.120" v="184" actId="478"/>
+          <ac:spMkLst>
+            <pc:docMk/>
+            <pc:sldMk cId="1767767614" sldId="256"/>
+            <ac:spMk id="2" creationId="{47543A3D-EDEE-C85C-357D-62A727267337}"/>
+          </ac:spMkLst>
+        </pc:spChg>
         <pc:spChg chg="mod">
-          <ac:chgData name="Andrew Hubbard" userId="efcfa07183130be2" providerId="LiveId" clId="{BD549498-3C09-4EB4-B4FE-2C5D88A772BF}" dt="2023-07-26T01:32:38.159" v="13" actId="1035"/>
+          <ac:chgData name="Andrew Hubbard" userId="efcfa07183130be2" providerId="LiveId" clId="{BD549498-3C09-4EB4-B4FE-2C5D88A772BF}" dt="2023-07-28T09:18:04.771" v="181" actId="962"/>
           <ac:spMkLst>
             <pc:docMk/>
             <pc:sldMk cId="1767767614" sldId="256"/>
@@ -131,7 +152,7 @@
           </ac:spMkLst>
         </pc:spChg>
         <pc:spChg chg="mod">
-          <ac:chgData name="Andrew Hubbard" userId="efcfa07183130be2" providerId="LiveId" clId="{BD549498-3C09-4EB4-B4FE-2C5D88A772BF}" dt="2023-07-26T01:32:38.159" v="13" actId="1035"/>
+          <ac:chgData name="Andrew Hubbard" userId="efcfa07183130be2" providerId="LiveId" clId="{BD549498-3C09-4EB4-B4FE-2C5D88A772BF}" dt="2023-07-28T09:17:56.475" v="180" actId="962"/>
           <ac:spMkLst>
             <pc:docMk/>
             <pc:sldMk cId="1767767614" sldId="256"/>
@@ -139,7 +160,7 @@
           </ac:spMkLst>
         </pc:spChg>
         <pc:spChg chg="mod">
-          <ac:chgData name="Andrew Hubbard" userId="efcfa07183130be2" providerId="LiveId" clId="{BD549498-3C09-4EB4-B4FE-2C5D88A772BF}" dt="2023-07-26T01:32:38.159" v="13" actId="1035"/>
+          <ac:chgData name="Andrew Hubbard" userId="efcfa07183130be2" providerId="LiveId" clId="{BD549498-3C09-4EB4-B4FE-2C5D88A772BF}" dt="2023-07-28T09:17:22.586" v="178" actId="962"/>
           <ac:spMkLst>
             <pc:docMk/>
             <pc:sldMk cId="1767767614" sldId="256"/>
@@ -147,7 +168,7 @@
           </ac:spMkLst>
         </pc:spChg>
         <pc:spChg chg="mod">
-          <ac:chgData name="Andrew Hubbard" userId="efcfa07183130be2" providerId="LiveId" clId="{BD549498-3C09-4EB4-B4FE-2C5D88A772BF}" dt="2023-07-26T01:33:01.598" v="25" actId="14100"/>
+          <ac:chgData name="Andrew Hubbard" userId="efcfa07183130be2" providerId="LiveId" clId="{BD549498-3C09-4EB4-B4FE-2C5D88A772BF}" dt="2023-07-28T09:16:58.572" v="177" actId="962"/>
           <ac:spMkLst>
             <pc:docMk/>
             <pc:sldMk cId="1767767614" sldId="256"/>
@@ -155,7 +176,7 @@
           </ac:spMkLst>
         </pc:spChg>
         <pc:spChg chg="mod">
-          <ac:chgData name="Andrew Hubbard" userId="efcfa07183130be2" providerId="LiveId" clId="{BD549498-3C09-4EB4-B4FE-2C5D88A772BF}" dt="2023-07-26T01:33:01.598" v="25" actId="14100"/>
+          <ac:chgData name="Andrew Hubbard" userId="efcfa07183130be2" providerId="LiveId" clId="{BD549498-3C09-4EB4-B4FE-2C5D88A772BF}" dt="2023-07-28T09:16:42.113" v="176" actId="962"/>
           <ac:spMkLst>
             <pc:docMk/>
             <pc:sldMk cId="1767767614" sldId="256"/>
@@ -163,7 +184,7 @@
           </ac:spMkLst>
         </pc:spChg>
         <pc:spChg chg="mod ord">
-          <ac:chgData name="Andrew Hubbard" userId="efcfa07183130be2" providerId="LiveId" clId="{BD549498-3C09-4EB4-B4FE-2C5D88A772BF}" dt="2023-07-26T01:33:01.598" v="25" actId="14100"/>
+          <ac:chgData name="Andrew Hubbard" userId="efcfa07183130be2" providerId="LiveId" clId="{BD549498-3C09-4EB4-B4FE-2C5D88A772BF}" dt="2023-07-28T09:18:22.543" v="182" actId="962"/>
           <ac:spMkLst>
             <pc:docMk/>
             <pc:sldMk cId="1767767614" sldId="256"/>
@@ -171,7 +192,7 @@
           </ac:spMkLst>
         </pc:spChg>
         <pc:spChg chg="mod">
-          <ac:chgData name="Andrew Hubbard" userId="efcfa07183130be2" providerId="LiveId" clId="{BD549498-3C09-4EB4-B4FE-2C5D88A772BF}" dt="2023-07-26T01:33:27.522" v="39" actId="554"/>
+          <ac:chgData name="Andrew Hubbard" userId="efcfa07183130be2" providerId="LiveId" clId="{BD549498-3C09-4EB4-B4FE-2C5D88A772BF}" dt="2023-07-28T09:16:22.579" v="175" actId="962"/>
           <ac:spMkLst>
             <pc:docMk/>
             <pc:sldMk cId="1767767614" sldId="256"/>
@@ -179,7 +200,15 @@
           </ac:spMkLst>
         </pc:spChg>
         <pc:spChg chg="mod">
-          <ac:chgData name="Andrew Hubbard" userId="efcfa07183130be2" providerId="LiveId" clId="{BD549498-3C09-4EB4-B4FE-2C5D88A772BF}" dt="2023-07-26T01:33:39.494" v="41" actId="14100"/>
+          <ac:chgData name="Andrew Hubbard" userId="efcfa07183130be2" providerId="LiveId" clId="{BD549498-3C09-4EB4-B4FE-2C5D88A772BF}" dt="2023-07-28T09:16:11.913" v="174" actId="962"/>
+          <ac:spMkLst>
+            <pc:docMk/>
+            <pc:sldMk cId="1767767614" sldId="256"/>
+            <ac:spMk id="35" creationId="{A2DCAF9E-70F0-69C2-3B03-5B7391C30374}"/>
+          </ac:spMkLst>
+        </pc:spChg>
+        <pc:spChg chg="mod">
+          <ac:chgData name="Andrew Hubbard" userId="efcfa07183130be2" providerId="LiveId" clId="{BD549498-3C09-4EB4-B4FE-2C5D88A772BF}" dt="2023-07-28T09:16:01.347" v="173" actId="962"/>
           <ac:spMkLst>
             <pc:docMk/>
             <pc:sldMk cId="1767767614" sldId="256"/>
@@ -187,7 +216,7 @@
           </ac:spMkLst>
         </pc:spChg>
         <pc:spChg chg="mod">
-          <ac:chgData name="Andrew Hubbard" userId="efcfa07183130be2" providerId="LiveId" clId="{BD549498-3C09-4EB4-B4FE-2C5D88A772BF}" dt="2023-07-26T01:33:34.213" v="40" actId="554"/>
+          <ac:chgData name="Andrew Hubbard" userId="efcfa07183130be2" providerId="LiveId" clId="{BD549498-3C09-4EB4-B4FE-2C5D88A772BF}" dt="2023-07-28T09:15:50.960" v="172" actId="962"/>
           <ac:spMkLst>
             <pc:docMk/>
             <pc:sldMk cId="1767767614" sldId="256"/>
@@ -195,7 +224,7 @@
           </ac:spMkLst>
         </pc:spChg>
         <pc:spChg chg="mod">
-          <ac:chgData name="Andrew Hubbard" userId="efcfa07183130be2" providerId="LiveId" clId="{BD549498-3C09-4EB4-B4FE-2C5D88A772BF}" dt="2023-07-26T01:33:34.213" v="40" actId="554"/>
+          <ac:chgData name="Andrew Hubbard" userId="efcfa07183130be2" providerId="LiveId" clId="{BD549498-3C09-4EB4-B4FE-2C5D88A772BF}" dt="2023-07-28T09:15:38.386" v="171" actId="962"/>
           <ac:spMkLst>
             <pc:docMk/>
             <pc:sldMk cId="1767767614" sldId="256"/>
@@ -339,7 +368,7 @@
           <a:p>
             <a:fld id="{BC16F218-39A0-41C7-9739-6124B1EB9EBC}" type="datetimeFigureOut">
               <a:rPr lang="en-US" smtClean="0"/>
-              <a:t>7/26/2023</a:t>
+              <a:t>7/28/2023</a:t>
             </a:fld>
             <a:endParaRPr lang="en-US"/>
           </a:p>
@@ -509,7 +538,7 @@
           <a:p>
             <a:fld id="{BC16F218-39A0-41C7-9739-6124B1EB9EBC}" type="datetimeFigureOut">
               <a:rPr lang="en-US" smtClean="0"/>
-              <a:t>7/26/2023</a:t>
+              <a:t>7/28/2023</a:t>
             </a:fld>
             <a:endParaRPr lang="en-US"/>
           </a:p>
@@ -689,7 +718,7 @@
           <a:p>
             <a:fld id="{BC16F218-39A0-41C7-9739-6124B1EB9EBC}" type="datetimeFigureOut">
               <a:rPr lang="en-US" smtClean="0"/>
-              <a:t>7/26/2023</a:t>
+              <a:t>7/28/2023</a:t>
             </a:fld>
             <a:endParaRPr lang="en-US"/>
           </a:p>
@@ -859,7 +888,7 @@
           <a:p>
             <a:fld id="{BC16F218-39A0-41C7-9739-6124B1EB9EBC}" type="datetimeFigureOut">
               <a:rPr lang="en-US" smtClean="0"/>
-              <a:t>7/26/2023</a:t>
+              <a:t>7/28/2023</a:t>
             </a:fld>
             <a:endParaRPr lang="en-US"/>
           </a:p>
@@ -1105,7 +1134,7 @@
           <a:p>
             <a:fld id="{BC16F218-39A0-41C7-9739-6124B1EB9EBC}" type="datetimeFigureOut">
               <a:rPr lang="en-US" smtClean="0"/>
-              <a:t>7/26/2023</a:t>
+              <a:t>7/28/2023</a:t>
             </a:fld>
             <a:endParaRPr lang="en-US"/>
           </a:p>
@@ -1337,7 +1366,7 @@
           <a:p>
             <a:fld id="{BC16F218-39A0-41C7-9739-6124B1EB9EBC}" type="datetimeFigureOut">
               <a:rPr lang="en-US" smtClean="0"/>
-              <a:t>7/26/2023</a:t>
+              <a:t>7/28/2023</a:t>
             </a:fld>
             <a:endParaRPr lang="en-US"/>
           </a:p>
@@ -1704,7 +1733,7 @@
           <a:p>
             <a:fld id="{BC16F218-39A0-41C7-9739-6124B1EB9EBC}" type="datetimeFigureOut">
               <a:rPr lang="en-US" smtClean="0"/>
-              <a:t>7/26/2023</a:t>
+              <a:t>7/28/2023</a:t>
             </a:fld>
             <a:endParaRPr lang="en-US"/>
           </a:p>
@@ -1822,7 +1851,7 @@
           <a:p>
             <a:fld id="{BC16F218-39A0-41C7-9739-6124B1EB9EBC}" type="datetimeFigureOut">
               <a:rPr lang="en-US" smtClean="0"/>
-              <a:t>7/26/2023</a:t>
+              <a:t>7/28/2023</a:t>
             </a:fld>
             <a:endParaRPr lang="en-US"/>
           </a:p>
@@ -1917,7 +1946,7 @@
           <a:p>
             <a:fld id="{BC16F218-39A0-41C7-9739-6124B1EB9EBC}" type="datetimeFigureOut">
               <a:rPr lang="en-US" smtClean="0"/>
-              <a:t>7/26/2023</a:t>
+              <a:t>7/28/2023</a:t>
             </a:fld>
             <a:endParaRPr lang="en-US"/>
           </a:p>
@@ -2194,7 +2223,7 @@
           <a:p>
             <a:fld id="{BC16F218-39A0-41C7-9739-6124B1EB9EBC}" type="datetimeFigureOut">
               <a:rPr lang="en-US" smtClean="0"/>
-              <a:t>7/26/2023</a:t>
+              <a:t>7/28/2023</a:t>
             </a:fld>
             <a:endParaRPr lang="en-US"/>
           </a:p>
@@ -2451,7 +2480,7 @@
           <a:p>
             <a:fld id="{BC16F218-39A0-41C7-9739-6124B1EB9EBC}" type="datetimeFigureOut">
               <a:rPr lang="en-US" smtClean="0"/>
-              <a:t>7/26/2023</a:t>
+              <a:t>7/28/2023</a:t>
             </a:fld>
             <a:endParaRPr lang="en-US"/>
           </a:p>
@@ -2664,7 +2693,7 @@
           <a:p>
             <a:fld id="{BC16F218-39A0-41C7-9739-6124B1EB9EBC}" type="datetimeFigureOut">
               <a:rPr lang="en-US" smtClean="0"/>
-              <a:t>7/26/2023</a:t>
+              <a:t>7/28/2023</a:t>
             </a:fld>
             <a:endParaRPr lang="en-US"/>
           </a:p>
@@ -3081,7 +3110,7 @@
       </p:grpSpPr>
       <p:sp>
         <p:nvSpPr>
-          <p:cNvPr id="33" name="Rectangle: Rounded Corners 32">
+          <p:cNvPr id="33" name="Slicer Panel Background">
             <a:extLst>
               <a:ext uri="{FF2B5EF4-FFF2-40B4-BE49-F238E27FC236}">
                 <a16:creationId xmlns:a16="http://schemas.microsoft.com/office/drawing/2014/main" id="{65536100-CA4D-75FB-4E79-36F3236061D4}"/>
@@ -3093,8 +3122,8 @@
         </p:nvSpPr>
         <p:spPr>
           <a:xfrm>
-            <a:off x="1429407" y="717440"/>
-            <a:ext cx="9190146" cy="702205"/>
+            <a:off x="996853" y="559789"/>
+            <a:ext cx="9622700" cy="538817"/>
           </a:xfrm>
           <a:prstGeom prst="roundRect">
             <a:avLst/>
@@ -3140,7 +3169,7 @@
       </p:sp>
       <p:sp>
         <p:nvSpPr>
-          <p:cNvPr id="28" name="Rectangle 27">
+          <p:cNvPr id="28" name="Title Bar">
             <a:extLst>
               <a:ext uri="{FF2B5EF4-FFF2-40B4-BE49-F238E27FC236}">
                 <a16:creationId xmlns:a16="http://schemas.microsoft.com/office/drawing/2014/main" id="{DF52F5A7-FD76-D141-0BA2-536B5B2088BB}"/>
@@ -3153,7 +3182,7 @@
         <p:spPr>
           <a:xfrm>
             <a:off x="245844" y="89340"/>
-            <a:ext cx="10238225" cy="467710"/>
+            <a:ext cx="10238225" cy="365760"/>
           </a:xfrm>
           <a:prstGeom prst="rect">
             <a:avLst/>
@@ -3192,7 +3221,7 @@
       </p:sp>
       <p:sp>
         <p:nvSpPr>
-          <p:cNvPr id="29" name="Rectangle 28">
+          <p:cNvPr id="29" name="Dashboard Title Left Accent">
             <a:extLst>
               <a:ext uri="{FF2B5EF4-FFF2-40B4-BE49-F238E27FC236}">
                 <a16:creationId xmlns:a16="http://schemas.microsoft.com/office/drawing/2014/main" id="{C9A546F3-70CF-FA10-5E2F-E92985A80D82}"/>
@@ -3205,7 +3234,7 @@
         <p:spPr>
           <a:xfrm>
             <a:off x="110359" y="89340"/>
-            <a:ext cx="135485" cy="467710"/>
+            <a:ext cx="135485" cy="365760"/>
           </a:xfrm>
           <a:prstGeom prst="rect">
             <a:avLst/>
@@ -3244,7 +3273,7 @@
       </p:sp>
       <p:sp>
         <p:nvSpPr>
-          <p:cNvPr id="30" name="Rectangle 29">
+          <p:cNvPr id="30" name="Dashboard Title Bar Right Accent">
             <a:extLst>
               <a:ext uri="{FF2B5EF4-FFF2-40B4-BE49-F238E27FC236}">
                 <a16:creationId xmlns:a16="http://schemas.microsoft.com/office/drawing/2014/main" id="{583456BB-E255-CD32-1B89-33C9864B5F33}"/>
@@ -3257,7 +3286,7 @@
         <p:spPr>
           <a:xfrm>
             <a:off x="10484069" y="89340"/>
-            <a:ext cx="135485" cy="467710"/>
+            <a:ext cx="135485" cy="365760"/>
           </a:xfrm>
           <a:prstGeom prst="rect">
             <a:avLst/>
@@ -3296,7 +3325,7 @@
       </p:sp>
       <p:sp>
         <p:nvSpPr>
-          <p:cNvPr id="31" name="Rectangle: Rounded Corners 30">
+          <p:cNvPr id="31" name="Navigation Panel Left Side">
             <a:extLst>
               <a:ext uri="{FF2B5EF4-FFF2-40B4-BE49-F238E27FC236}">
                 <a16:creationId xmlns:a16="http://schemas.microsoft.com/office/drawing/2014/main" id="{FF42E2FC-A9C7-CA34-5EA0-AB6F50F2B446}"/>
@@ -3308,8 +3337,8 @@
         </p:nvSpPr>
         <p:spPr>
           <a:xfrm>
-            <a:off x="110360" y="717439"/>
-            <a:ext cx="1392619" cy="5139559"/>
+            <a:off x="44814" y="559788"/>
+            <a:ext cx="1458166" cy="5297212"/>
           </a:xfrm>
           <a:prstGeom prst="roundRect">
             <a:avLst>
@@ -3357,7 +3386,7 @@
       </p:sp>
       <p:sp>
         <p:nvSpPr>
-          <p:cNvPr id="32" name="Rectangle: Rounded Corners 31">
+          <p:cNvPr id="32" name="Navigation Panel Right Side">
             <a:extLst>
               <a:ext uri="{FF2B5EF4-FFF2-40B4-BE49-F238E27FC236}">
                 <a16:creationId xmlns:a16="http://schemas.microsoft.com/office/drawing/2014/main" id="{0499EFA2-8BA3-E5AA-AA89-FEB09FBA66CE}"/>
@@ -3369,8 +3398,8 @@
         </p:nvSpPr>
         <p:spPr>
           <a:xfrm>
-            <a:off x="1240224" y="717439"/>
-            <a:ext cx="546538" cy="5139559"/>
+            <a:off x="966952" y="559788"/>
+            <a:ext cx="572262" cy="5297212"/>
           </a:xfrm>
           <a:prstGeom prst="roundRect">
             <a:avLst/>
@@ -3410,7 +3439,7 @@
       </p:sp>
       <p:sp>
         <p:nvSpPr>
-          <p:cNvPr id="34" name="Rectangle: Rounded Corners 33">
+          <p:cNvPr id="34" name="Total Card">
             <a:extLst>
               <a:ext uri="{FF2B5EF4-FFF2-40B4-BE49-F238E27FC236}">
                 <a16:creationId xmlns:a16="http://schemas.microsoft.com/office/drawing/2014/main" id="{FCD43CFD-DC01-C617-51DA-D908F7D2D61B}"/>
@@ -3422,8 +3451,8 @@
         </p:nvSpPr>
         <p:spPr>
           <a:xfrm>
-            <a:off x="1881352" y="1597574"/>
-            <a:ext cx="2081048" cy="798786"/>
+            <a:off x="1703496" y="1246255"/>
+            <a:ext cx="2291255" cy="1097280"/>
           </a:xfrm>
           <a:prstGeom prst="roundRect">
             <a:avLst>
@@ -3471,7 +3500,7 @@
       </p:sp>
       <p:sp>
         <p:nvSpPr>
-          <p:cNvPr id="35" name="Rectangle: Rounded Corners 34">
+          <p:cNvPr id="35" name="Province Card">
             <a:extLst>
               <a:ext uri="{FF2B5EF4-FFF2-40B4-BE49-F238E27FC236}">
                 <a16:creationId xmlns:a16="http://schemas.microsoft.com/office/drawing/2014/main" id="{A2DCAF9E-70F0-69C2-3B03-5B7391C30374}"/>
@@ -3483,8 +3512,8 @@
         </p:nvSpPr>
         <p:spPr>
           <a:xfrm>
-            <a:off x="1881352" y="2554013"/>
-            <a:ext cx="2081048" cy="1271751"/>
+            <a:off x="1671145" y="2438401"/>
+            <a:ext cx="2291255" cy="1387364"/>
           </a:xfrm>
           <a:prstGeom prst="roundRect">
             <a:avLst>
@@ -3526,7 +3555,7 @@
       </p:sp>
       <p:sp>
         <p:nvSpPr>
-          <p:cNvPr id="36" name="Rectangle: Rounded Corners 35">
+          <p:cNvPr id="36" name="Postcode Card">
             <a:extLst>
               <a:ext uri="{FF2B5EF4-FFF2-40B4-BE49-F238E27FC236}">
                 <a16:creationId xmlns:a16="http://schemas.microsoft.com/office/drawing/2014/main" id="{125F922C-7925-92FC-8D9D-9FBCD1E762F4}"/>
@@ -3538,8 +3567,8 @@
         </p:nvSpPr>
         <p:spPr>
           <a:xfrm>
-            <a:off x="1881352" y="3983418"/>
-            <a:ext cx="8738201" cy="1873582"/>
+            <a:off x="1671144" y="3983418"/>
+            <a:ext cx="8988447" cy="1873582"/>
           </a:xfrm>
           <a:prstGeom prst="roundRect">
             <a:avLst>
@@ -3580,7 +3609,7 @@
       </p:sp>
       <p:sp>
         <p:nvSpPr>
-          <p:cNvPr id="37" name="Rectangle: Rounded Corners 36">
+          <p:cNvPr id="37" name="District Card">
             <a:extLst>
               <a:ext uri="{FF2B5EF4-FFF2-40B4-BE49-F238E27FC236}">
                 <a16:creationId xmlns:a16="http://schemas.microsoft.com/office/drawing/2014/main" id="{A76EAB3C-E955-0C68-E28D-3C41C3C2CCE1}"/>
@@ -3592,8 +3621,8 @@
         </p:nvSpPr>
         <p:spPr>
           <a:xfrm>
-            <a:off x="4182016" y="1597574"/>
-            <a:ext cx="3108960" cy="2194560"/>
+            <a:off x="4126459" y="1246255"/>
+            <a:ext cx="3200400" cy="2620499"/>
           </a:xfrm>
           <a:prstGeom prst="roundRect">
             <a:avLst>
@@ -3635,7 +3664,7 @@
       </p:sp>
       <p:sp>
         <p:nvSpPr>
-          <p:cNvPr id="38" name="Rectangle: Rounded Corners 37">
+          <p:cNvPr id="38" name="Sub District Card">
             <a:extLst>
               <a:ext uri="{FF2B5EF4-FFF2-40B4-BE49-F238E27FC236}">
                 <a16:creationId xmlns:a16="http://schemas.microsoft.com/office/drawing/2014/main" id="{61A3848A-620A-D002-234B-9D67FCF05F5A}"/>
@@ -3647,8 +3676,8 @@
         </p:nvSpPr>
         <p:spPr>
           <a:xfrm>
-            <a:off x="7510593" y="1597574"/>
-            <a:ext cx="3108960" cy="2196660"/>
+            <a:off x="7458568" y="1246255"/>
+            <a:ext cx="3200400" cy="2620499"/>
           </a:xfrm>
           <a:prstGeom prst="roundRect">
             <a:avLst>

</xml_diff>

<commit_message>
Dashboards, For Geographic, Invesment & Workforce completed. Remaining are Industry, Address List and Information
</commit_message>
<xml_diff>
--- a/Background/Backgrounds for Report.pptx
+++ b/Background/Backgrounds for Report.pptx
@@ -6,6 +6,7 @@
   </p:sldMasterIdLst>
   <p:sldIdLst>
     <p:sldId id="256" r:id="rId2"/>
+    <p:sldId id="257" r:id="rId3"/>
   </p:sldIdLst>
   <p:sldSz cx="10729913" cy="6035675"/>
   <p:notesSz cx="6858000" cy="9144000"/>
@@ -115,7 +116,7 @@
 <file path=ppt/revisionInfo.xml><?xml version="1.0" encoding="utf-8"?>
 <p1510:revInfo xmlns:a="http://schemas.openxmlformats.org/drawingml/2006/main" xmlns:r="http://schemas.openxmlformats.org/officeDocument/2006/relationships" xmlns:p1510="http://schemas.microsoft.com/office/powerpoint/2015/10/main">
   <p1510:revLst>
-    <p1510:client id="{BD549498-3C09-4EB4-B4FE-2C5D88A772BF}" v="15" dt="2023-07-28T09:18:33.485"/>
+    <p1510:client id="{BD549498-3C09-4EB4-B4FE-2C5D88A772BF}" v="30" dt="2023-08-01T02:17:59.546"/>
   </p1510:revLst>
 </p1510:revInfo>
 </file>
@@ -124,13 +125,13 @@
 <pc:chgInfo xmlns:a="http://schemas.openxmlformats.org/drawingml/2006/main" xmlns:r="http://schemas.openxmlformats.org/officeDocument/2006/relationships" xmlns:ac="http://schemas.microsoft.com/office/drawing/2013/main/command" xmlns:pc="http://schemas.microsoft.com/office/powerpoint/2013/main/command">
   <pc:docChgLst>
     <pc:chgData name="Andrew Hubbard" userId="efcfa07183130be2" providerId="LiveId" clId="{BD549498-3C09-4EB4-B4FE-2C5D88A772BF}"/>
-    <pc:docChg chg="undo custSel modSld">
-      <pc:chgData name="Andrew Hubbard" userId="efcfa07183130be2" providerId="LiveId" clId="{BD549498-3C09-4EB4-B4FE-2C5D88A772BF}" dt="2023-07-28T09:18:35.120" v="184" actId="478"/>
+    <pc:docChg chg="undo custSel addSld modSld">
+      <pc:chgData name="Andrew Hubbard" userId="efcfa07183130be2" providerId="LiveId" clId="{BD549498-3C09-4EB4-B4FE-2C5D88A772BF}" dt="2023-08-01T02:18:19.188" v="242" actId="14100"/>
       <pc:docMkLst>
         <pc:docMk/>
       </pc:docMkLst>
-      <pc:sldChg chg="addSp delSp modSp mod">
-        <pc:chgData name="Andrew Hubbard" userId="efcfa07183130be2" providerId="LiveId" clId="{BD549498-3C09-4EB4-B4FE-2C5D88A772BF}" dt="2023-07-28T09:18:35.120" v="184" actId="478"/>
+      <pc:sldChg chg="addSp delSp modSp mod setBg">
+        <pc:chgData name="Andrew Hubbard" userId="efcfa07183130be2" providerId="LiveId" clId="{BD549498-3C09-4EB4-B4FE-2C5D88A772BF}" dt="2023-07-31T02:59:17.532" v="234" actId="207"/>
         <pc:sldMkLst>
           <pc:docMk/>
           <pc:sldMk cId="1767767614" sldId="256"/>
@@ -141,6 +142,14 @@
             <pc:docMk/>
             <pc:sldMk cId="1767767614" sldId="256"/>
             <ac:spMk id="2" creationId="{47543A3D-EDEE-C85C-357D-62A727267337}"/>
+          </ac:spMkLst>
+        </pc:spChg>
+        <pc:spChg chg="add mod">
+          <ac:chgData name="Andrew Hubbard" userId="efcfa07183130be2" providerId="LiveId" clId="{BD549498-3C09-4EB4-B4FE-2C5D88A772BF}" dt="2023-07-29T03:37:14.065" v="210" actId="553"/>
+          <ac:spMkLst>
+            <pc:docMk/>
+            <pc:sldMk cId="1767767614" sldId="256"/>
+            <ac:spMk id="2" creationId="{5DD857F2-0BBC-4007-2509-B3035B1ADB09}"/>
           </ac:spMkLst>
         </pc:spChg>
         <pc:spChg chg="mod">
@@ -160,7 +169,7 @@
           </ac:spMkLst>
         </pc:spChg>
         <pc:spChg chg="mod">
-          <ac:chgData name="Andrew Hubbard" userId="efcfa07183130be2" providerId="LiveId" clId="{BD549498-3C09-4EB4-B4FE-2C5D88A772BF}" dt="2023-07-28T09:17:22.586" v="178" actId="962"/>
+          <ac:chgData name="Andrew Hubbard" userId="efcfa07183130be2" providerId="LiveId" clId="{BD549498-3C09-4EB4-B4FE-2C5D88A772BF}" dt="2023-07-31T02:50:56.573" v="212" actId="207"/>
           <ac:spMkLst>
             <pc:docMk/>
             <pc:sldMk cId="1767767614" sldId="256"/>
@@ -168,7 +177,7 @@
           </ac:spMkLst>
         </pc:spChg>
         <pc:spChg chg="mod">
-          <ac:chgData name="Andrew Hubbard" userId="efcfa07183130be2" providerId="LiveId" clId="{BD549498-3C09-4EB4-B4FE-2C5D88A772BF}" dt="2023-07-28T09:16:58.572" v="177" actId="962"/>
+          <ac:chgData name="Andrew Hubbard" userId="efcfa07183130be2" providerId="LiveId" clId="{BD549498-3C09-4EB4-B4FE-2C5D88A772BF}" dt="2023-07-29T01:03:44.491" v="190" actId="555"/>
           <ac:spMkLst>
             <pc:docMk/>
             <pc:sldMk cId="1767767614" sldId="256"/>
@@ -192,7 +201,7 @@
           </ac:spMkLst>
         </pc:spChg>
         <pc:spChg chg="mod">
-          <ac:chgData name="Andrew Hubbard" userId="efcfa07183130be2" providerId="LiveId" clId="{BD549498-3C09-4EB4-B4FE-2C5D88A772BF}" dt="2023-07-28T09:16:22.579" v="175" actId="962"/>
+          <ac:chgData name="Andrew Hubbard" userId="efcfa07183130be2" providerId="LiveId" clId="{BD549498-3C09-4EB4-B4FE-2C5D88A772BF}" dt="2023-07-31T02:59:17.532" v="234" actId="207"/>
           <ac:spMkLst>
             <pc:docMk/>
             <pc:sldMk cId="1767767614" sldId="256"/>
@@ -200,7 +209,7 @@
           </ac:spMkLst>
         </pc:spChg>
         <pc:spChg chg="mod">
-          <ac:chgData name="Andrew Hubbard" userId="efcfa07183130be2" providerId="LiveId" clId="{BD549498-3C09-4EB4-B4FE-2C5D88A772BF}" dt="2023-07-28T09:16:11.913" v="174" actId="962"/>
+          <ac:chgData name="Andrew Hubbard" userId="efcfa07183130be2" providerId="LiveId" clId="{BD549498-3C09-4EB4-B4FE-2C5D88A772BF}" dt="2023-07-31T02:58:59.157" v="233" actId="555"/>
           <ac:spMkLst>
             <pc:docMk/>
             <pc:sldMk cId="1767767614" sldId="256"/>
@@ -208,7 +217,7 @@
           </ac:spMkLst>
         </pc:spChg>
         <pc:spChg chg="mod">
-          <ac:chgData name="Andrew Hubbard" userId="efcfa07183130be2" providerId="LiveId" clId="{BD549498-3C09-4EB4-B4FE-2C5D88A772BF}" dt="2023-07-28T09:16:01.347" v="173" actId="962"/>
+          <ac:chgData name="Andrew Hubbard" userId="efcfa07183130be2" providerId="LiveId" clId="{BD549498-3C09-4EB4-B4FE-2C5D88A772BF}" dt="2023-07-29T03:37:14.065" v="210" actId="553"/>
           <ac:spMkLst>
             <pc:docMk/>
             <pc:sldMk cId="1767767614" sldId="256"/>
@@ -216,19 +225,42 @@
           </ac:spMkLst>
         </pc:spChg>
         <pc:spChg chg="mod">
-          <ac:chgData name="Andrew Hubbard" userId="efcfa07183130be2" providerId="LiveId" clId="{BD549498-3C09-4EB4-B4FE-2C5D88A772BF}" dt="2023-07-28T09:15:50.960" v="172" actId="962"/>
+          <ac:chgData name="Andrew Hubbard" userId="efcfa07183130be2" providerId="LiveId" clId="{BD549498-3C09-4EB4-B4FE-2C5D88A772BF}" dt="2023-07-31T02:58:59.157" v="233" actId="555"/>
           <ac:spMkLst>
             <pc:docMk/>
             <pc:sldMk cId="1767767614" sldId="256"/>
             <ac:spMk id="37" creationId="{A76EAB3C-E955-0C68-E28D-3C41C3C2CCE1}"/>
           </ac:spMkLst>
         </pc:spChg>
-        <pc:spChg chg="mod">
-          <ac:chgData name="Andrew Hubbard" userId="efcfa07183130be2" providerId="LiveId" clId="{BD549498-3C09-4EB4-B4FE-2C5D88A772BF}" dt="2023-07-28T09:15:38.386" v="171" actId="962"/>
+        <pc:spChg chg="del mod">
+          <ac:chgData name="Andrew Hubbard" userId="efcfa07183130be2" providerId="LiveId" clId="{BD549498-3C09-4EB4-B4FE-2C5D88A772BF}" dt="2023-07-29T03:36:48.869" v="206" actId="478"/>
           <ac:spMkLst>
             <pc:docMk/>
             <pc:sldMk cId="1767767614" sldId="256"/>
             <ac:spMk id="38" creationId="{61A3848A-620A-D002-234B-9D67FCF05F5A}"/>
+          </ac:spMkLst>
+        </pc:spChg>
+      </pc:sldChg>
+      <pc:sldChg chg="addSp modSp add mod">
+        <pc:chgData name="Andrew Hubbard" userId="efcfa07183130be2" providerId="LiveId" clId="{BD549498-3C09-4EB4-B4FE-2C5D88A772BF}" dt="2023-08-01T02:18:19.188" v="242" actId="14100"/>
+        <pc:sldMkLst>
+          <pc:docMk/>
+          <pc:sldMk cId="4033107535" sldId="257"/>
+        </pc:sldMkLst>
+        <pc:spChg chg="add mod">
+          <ac:chgData name="Andrew Hubbard" userId="efcfa07183130be2" providerId="LiveId" clId="{BD549498-3C09-4EB4-B4FE-2C5D88A772BF}" dt="2023-08-01T02:18:19.188" v="242" actId="14100"/>
+          <ac:spMkLst>
+            <pc:docMk/>
+            <pc:sldMk cId="4033107535" sldId="257"/>
+            <ac:spMk id="3" creationId="{159EF9D3-463A-FB4C-565B-AA61C7B99300}"/>
+          </ac:spMkLst>
+        </pc:spChg>
+        <pc:spChg chg="mod">
+          <ac:chgData name="Andrew Hubbard" userId="efcfa07183130be2" providerId="LiveId" clId="{BD549498-3C09-4EB4-B4FE-2C5D88A772BF}" dt="2023-08-01T02:17:46.993" v="236" actId="14100"/>
+          <ac:spMkLst>
+            <pc:docMk/>
+            <pc:sldMk cId="4033107535" sldId="257"/>
+            <ac:spMk id="36" creationId="{125F922C-7925-92FC-8D9D-9FBCD1E762F4}"/>
           </ac:spMkLst>
         </pc:spChg>
       </pc:sldChg>
@@ -368,7 +400,7 @@
           <a:p>
             <a:fld id="{BC16F218-39A0-41C7-9739-6124B1EB9EBC}" type="datetimeFigureOut">
               <a:rPr lang="en-US" smtClean="0"/>
-              <a:t>7/28/2023</a:t>
+              <a:t>8/1/2023</a:t>
             </a:fld>
             <a:endParaRPr lang="en-US"/>
           </a:p>
@@ -538,7 +570,7 @@
           <a:p>
             <a:fld id="{BC16F218-39A0-41C7-9739-6124B1EB9EBC}" type="datetimeFigureOut">
               <a:rPr lang="en-US" smtClean="0"/>
-              <a:t>7/28/2023</a:t>
+              <a:t>8/1/2023</a:t>
             </a:fld>
             <a:endParaRPr lang="en-US"/>
           </a:p>
@@ -718,7 +750,7 @@
           <a:p>
             <a:fld id="{BC16F218-39A0-41C7-9739-6124B1EB9EBC}" type="datetimeFigureOut">
               <a:rPr lang="en-US" smtClean="0"/>
-              <a:t>7/28/2023</a:t>
+              <a:t>8/1/2023</a:t>
             </a:fld>
             <a:endParaRPr lang="en-US"/>
           </a:p>
@@ -888,7 +920,7 @@
           <a:p>
             <a:fld id="{BC16F218-39A0-41C7-9739-6124B1EB9EBC}" type="datetimeFigureOut">
               <a:rPr lang="en-US" smtClean="0"/>
-              <a:t>7/28/2023</a:t>
+              <a:t>8/1/2023</a:t>
             </a:fld>
             <a:endParaRPr lang="en-US"/>
           </a:p>
@@ -1134,7 +1166,7 @@
           <a:p>
             <a:fld id="{BC16F218-39A0-41C7-9739-6124B1EB9EBC}" type="datetimeFigureOut">
               <a:rPr lang="en-US" smtClean="0"/>
-              <a:t>7/28/2023</a:t>
+              <a:t>8/1/2023</a:t>
             </a:fld>
             <a:endParaRPr lang="en-US"/>
           </a:p>
@@ -1366,7 +1398,7 @@
           <a:p>
             <a:fld id="{BC16F218-39A0-41C7-9739-6124B1EB9EBC}" type="datetimeFigureOut">
               <a:rPr lang="en-US" smtClean="0"/>
-              <a:t>7/28/2023</a:t>
+              <a:t>8/1/2023</a:t>
             </a:fld>
             <a:endParaRPr lang="en-US"/>
           </a:p>
@@ -1733,7 +1765,7 @@
           <a:p>
             <a:fld id="{BC16F218-39A0-41C7-9739-6124B1EB9EBC}" type="datetimeFigureOut">
               <a:rPr lang="en-US" smtClean="0"/>
-              <a:t>7/28/2023</a:t>
+              <a:t>8/1/2023</a:t>
             </a:fld>
             <a:endParaRPr lang="en-US"/>
           </a:p>
@@ -1851,7 +1883,7 @@
           <a:p>
             <a:fld id="{BC16F218-39A0-41C7-9739-6124B1EB9EBC}" type="datetimeFigureOut">
               <a:rPr lang="en-US" smtClean="0"/>
-              <a:t>7/28/2023</a:t>
+              <a:t>8/1/2023</a:t>
             </a:fld>
             <a:endParaRPr lang="en-US"/>
           </a:p>
@@ -1946,7 +1978,7 @@
           <a:p>
             <a:fld id="{BC16F218-39A0-41C7-9739-6124B1EB9EBC}" type="datetimeFigureOut">
               <a:rPr lang="en-US" smtClean="0"/>
-              <a:t>7/28/2023</a:t>
+              <a:t>8/1/2023</a:t>
             </a:fld>
             <a:endParaRPr lang="en-US"/>
           </a:p>
@@ -2223,7 +2255,7 @@
           <a:p>
             <a:fld id="{BC16F218-39A0-41C7-9739-6124B1EB9EBC}" type="datetimeFigureOut">
               <a:rPr lang="en-US" smtClean="0"/>
-              <a:t>7/28/2023</a:t>
+              <a:t>8/1/2023</a:t>
             </a:fld>
             <a:endParaRPr lang="en-US"/>
           </a:p>
@@ -2480,7 +2512,7 @@
           <a:p>
             <a:fld id="{BC16F218-39A0-41C7-9739-6124B1EB9EBC}" type="datetimeFigureOut">
               <a:rPr lang="en-US" smtClean="0"/>
-              <a:t>7/28/2023</a:t>
+              <a:t>8/1/2023</a:t>
             </a:fld>
             <a:endParaRPr lang="en-US"/>
           </a:p>
@@ -2693,7 +2725,7 @@
           <a:p>
             <a:fld id="{BC16F218-39A0-41C7-9739-6124B1EB9EBC}" type="datetimeFigureOut">
               <a:rPr lang="en-US" smtClean="0"/>
-              <a:t>7/28/2023</a:t>
+              <a:t>8/1/2023</a:t>
             </a:fld>
             <a:endParaRPr lang="en-US"/>
           </a:p>
@@ -3466,7 +3498,7 @@
             <a:noFill/>
           </a:ln>
           <a:effectLst>
-            <a:outerShdw blurRad="50800" dist="38100" dir="8100000" algn="tr" rotWithShape="0">
+            <a:outerShdw blurRad="50800" dist="76200" dir="8100000" algn="tr" rotWithShape="0">
               <a:prstClr val="black">
                 <a:alpha val="40000"/>
               </a:prstClr>
@@ -3512,16 +3544,16 @@
         </p:nvSpPr>
         <p:spPr>
           <a:xfrm>
-            <a:off x="1671145" y="2438401"/>
+            <a:off x="1703496" y="2479390"/>
             <a:ext cx="2291255" cy="1387364"/>
           </a:xfrm>
           <a:prstGeom prst="roundRect">
             <a:avLst>
-              <a:gd name="adj" fmla="val 12535"/>
+              <a:gd name="adj" fmla="val 8368"/>
             </a:avLst>
           </a:prstGeom>
           <a:solidFill>
-            <a:srgbClr val="7030A0"/>
+            <a:schemeClr val="bg1"/>
           </a:solidFill>
           <a:ln>
             <a:noFill/>
@@ -3621,12 +3653,12 @@
         </p:nvSpPr>
         <p:spPr>
           <a:xfrm>
-            <a:off x="4126459" y="1246255"/>
+            <a:off x="4142224" y="1246255"/>
             <a:ext cx="3200400" cy="2620499"/>
           </a:xfrm>
           <a:prstGeom prst="roundRect">
             <a:avLst>
-              <a:gd name="adj" fmla="val 12535"/>
+              <a:gd name="adj" fmla="val 5115"/>
             </a:avLst>
           </a:prstGeom>
           <a:solidFill>
@@ -3664,10 +3696,10 @@
       </p:sp>
       <p:sp>
         <p:nvSpPr>
-          <p:cNvPr id="38" name="Sub District Card">
+          <p:cNvPr id="2" name="District Card">
             <a:extLst>
               <a:ext uri="{FF2B5EF4-FFF2-40B4-BE49-F238E27FC236}">
-                <a16:creationId xmlns:a16="http://schemas.microsoft.com/office/drawing/2014/main" id="{61A3848A-620A-D002-234B-9D67FCF05F5A}"/>
+                <a16:creationId xmlns:a16="http://schemas.microsoft.com/office/drawing/2014/main" id="{5DD857F2-0BBC-4007-2509-B3035B1ADB09}"/>
               </a:ext>
             </a:extLst>
           </p:cNvPr>
@@ -3676,12 +3708,12 @@
         </p:nvSpPr>
         <p:spPr>
           <a:xfrm>
-            <a:off x="7458568" y="1246255"/>
+            <a:off x="7459191" y="1246255"/>
             <a:ext cx="3200400" cy="2620499"/>
           </a:xfrm>
           <a:prstGeom prst="roundRect">
             <a:avLst>
-              <a:gd name="adj" fmla="val 12535"/>
+              <a:gd name="adj" fmla="val 5115"/>
             </a:avLst>
           </a:prstGeom>
           <a:solidFill>
@@ -3721,6 +3753,709 @@
     <p:extLst>
       <p:ext uri="{BB962C8B-B14F-4D97-AF65-F5344CB8AC3E}">
         <p14:creationId xmlns:p14="http://schemas.microsoft.com/office/powerpoint/2010/main" val="1767767614"/>
+      </p:ext>
+    </p:extLst>
+  </p:cSld>
+  <p:clrMapOvr>
+    <a:masterClrMapping/>
+  </p:clrMapOvr>
+</p:sld>
+</file>
+
+<file path=ppt/slides/slide2.xml><?xml version="1.0" encoding="utf-8"?>
+<p:sld xmlns:a="http://schemas.openxmlformats.org/drawingml/2006/main" xmlns:r="http://schemas.openxmlformats.org/officeDocument/2006/relationships" xmlns:p="http://schemas.openxmlformats.org/presentationml/2006/main">
+  <p:cSld>
+    <p:bg>
+      <p:bgPr>
+        <a:solidFill>
+          <a:schemeClr val="bg1">
+            <a:lumMod val="95000"/>
+          </a:schemeClr>
+        </a:solidFill>
+        <a:effectLst/>
+      </p:bgPr>
+    </p:bg>
+    <p:spTree>
+      <p:nvGrpSpPr>
+        <p:cNvPr id="1" name=""/>
+        <p:cNvGrpSpPr/>
+        <p:nvPr/>
+      </p:nvGrpSpPr>
+      <p:grpSpPr>
+        <a:xfrm>
+          <a:off x="0" y="0"/>
+          <a:ext cx="0" cy="0"/>
+          <a:chOff x="0" y="0"/>
+          <a:chExt cx="0" cy="0"/>
+        </a:xfrm>
+      </p:grpSpPr>
+      <p:sp>
+        <p:nvSpPr>
+          <p:cNvPr id="33" name="Slicer Panel Background">
+            <a:extLst>
+              <a:ext uri="{FF2B5EF4-FFF2-40B4-BE49-F238E27FC236}">
+                <a16:creationId xmlns:a16="http://schemas.microsoft.com/office/drawing/2014/main" id="{65536100-CA4D-75FB-4E79-36F3236061D4}"/>
+              </a:ext>
+            </a:extLst>
+          </p:cNvPr>
+          <p:cNvSpPr/>
+          <p:nvPr/>
+        </p:nvSpPr>
+        <p:spPr>
+          <a:xfrm>
+            <a:off x="996853" y="559789"/>
+            <a:ext cx="9622700" cy="538817"/>
+          </a:xfrm>
+          <a:prstGeom prst="roundRect">
+            <a:avLst/>
+          </a:prstGeom>
+          <a:solidFill>
+            <a:schemeClr val="bg1"/>
+          </a:solidFill>
+          <a:ln>
+            <a:noFill/>
+          </a:ln>
+          <a:effectLst>
+            <a:outerShdw blurRad="50800" dist="38100" dir="5400000" algn="t" rotWithShape="0">
+              <a:prstClr val="black">
+                <a:alpha val="40000"/>
+              </a:prstClr>
+            </a:outerShdw>
+          </a:effectLst>
+        </p:spPr>
+        <p:style>
+          <a:lnRef idx="2">
+            <a:schemeClr val="accent1">
+              <a:shade val="15000"/>
+            </a:schemeClr>
+          </a:lnRef>
+          <a:fillRef idx="1">
+            <a:schemeClr val="accent1"/>
+          </a:fillRef>
+          <a:effectRef idx="0">
+            <a:schemeClr val="accent1"/>
+          </a:effectRef>
+          <a:fontRef idx="minor">
+            <a:schemeClr val="lt1"/>
+          </a:fontRef>
+        </p:style>
+        <p:txBody>
+          <a:bodyPr rtlCol="0" anchor="ctr"/>
+          <a:lstStyle/>
+          <a:p>
+            <a:pPr algn="ctr"/>
+            <a:endParaRPr lang="en-US"/>
+          </a:p>
+        </p:txBody>
+      </p:sp>
+      <p:sp>
+        <p:nvSpPr>
+          <p:cNvPr id="28" name="Title Bar">
+            <a:extLst>
+              <a:ext uri="{FF2B5EF4-FFF2-40B4-BE49-F238E27FC236}">
+                <a16:creationId xmlns:a16="http://schemas.microsoft.com/office/drawing/2014/main" id="{DF52F5A7-FD76-D141-0BA2-536B5B2088BB}"/>
+              </a:ext>
+            </a:extLst>
+          </p:cNvPr>
+          <p:cNvSpPr/>
+          <p:nvPr/>
+        </p:nvSpPr>
+        <p:spPr>
+          <a:xfrm>
+            <a:off x="245844" y="89340"/>
+            <a:ext cx="10238225" cy="365760"/>
+          </a:xfrm>
+          <a:prstGeom prst="rect">
+            <a:avLst/>
+          </a:prstGeom>
+          <a:solidFill>
+            <a:schemeClr val="bg1"/>
+          </a:solidFill>
+          <a:ln>
+            <a:noFill/>
+          </a:ln>
+        </p:spPr>
+        <p:style>
+          <a:lnRef idx="2">
+            <a:schemeClr val="accent1">
+              <a:shade val="15000"/>
+            </a:schemeClr>
+          </a:lnRef>
+          <a:fillRef idx="1">
+            <a:schemeClr val="accent1"/>
+          </a:fillRef>
+          <a:effectRef idx="0">
+            <a:schemeClr val="accent1"/>
+          </a:effectRef>
+          <a:fontRef idx="minor">
+            <a:schemeClr val="lt1"/>
+          </a:fontRef>
+        </p:style>
+        <p:txBody>
+          <a:bodyPr rtlCol="0" anchor="ctr"/>
+          <a:lstStyle/>
+          <a:p>
+            <a:pPr algn="ctr"/>
+            <a:endParaRPr lang="en-US"/>
+          </a:p>
+        </p:txBody>
+      </p:sp>
+      <p:sp>
+        <p:nvSpPr>
+          <p:cNvPr id="29" name="Dashboard Title Left Accent">
+            <a:extLst>
+              <a:ext uri="{FF2B5EF4-FFF2-40B4-BE49-F238E27FC236}">
+                <a16:creationId xmlns:a16="http://schemas.microsoft.com/office/drawing/2014/main" id="{C9A546F3-70CF-FA10-5E2F-E92985A80D82}"/>
+              </a:ext>
+            </a:extLst>
+          </p:cNvPr>
+          <p:cNvSpPr/>
+          <p:nvPr/>
+        </p:nvSpPr>
+        <p:spPr>
+          <a:xfrm>
+            <a:off x="110359" y="89340"/>
+            <a:ext cx="135485" cy="365760"/>
+          </a:xfrm>
+          <a:prstGeom prst="rect">
+            <a:avLst/>
+          </a:prstGeom>
+          <a:solidFill>
+            <a:srgbClr val="00B0F0"/>
+          </a:solidFill>
+          <a:ln>
+            <a:noFill/>
+          </a:ln>
+        </p:spPr>
+        <p:style>
+          <a:lnRef idx="2">
+            <a:schemeClr val="accent1">
+              <a:shade val="15000"/>
+            </a:schemeClr>
+          </a:lnRef>
+          <a:fillRef idx="1">
+            <a:schemeClr val="accent1"/>
+          </a:fillRef>
+          <a:effectRef idx="0">
+            <a:schemeClr val="accent1"/>
+          </a:effectRef>
+          <a:fontRef idx="minor">
+            <a:schemeClr val="lt1"/>
+          </a:fontRef>
+        </p:style>
+        <p:txBody>
+          <a:bodyPr rtlCol="0" anchor="ctr"/>
+          <a:lstStyle/>
+          <a:p>
+            <a:pPr algn="ctr"/>
+            <a:endParaRPr lang="en-US"/>
+          </a:p>
+        </p:txBody>
+      </p:sp>
+      <p:sp>
+        <p:nvSpPr>
+          <p:cNvPr id="30" name="Dashboard Title Bar Right Accent">
+            <a:extLst>
+              <a:ext uri="{FF2B5EF4-FFF2-40B4-BE49-F238E27FC236}">
+                <a16:creationId xmlns:a16="http://schemas.microsoft.com/office/drawing/2014/main" id="{583456BB-E255-CD32-1B89-33C9864B5F33}"/>
+              </a:ext>
+            </a:extLst>
+          </p:cNvPr>
+          <p:cNvSpPr/>
+          <p:nvPr/>
+        </p:nvSpPr>
+        <p:spPr>
+          <a:xfrm>
+            <a:off x="10484069" y="89340"/>
+            <a:ext cx="135485" cy="365760"/>
+          </a:xfrm>
+          <a:prstGeom prst="rect">
+            <a:avLst/>
+          </a:prstGeom>
+          <a:solidFill>
+            <a:srgbClr val="E01A8B"/>
+          </a:solidFill>
+          <a:ln>
+            <a:noFill/>
+          </a:ln>
+        </p:spPr>
+        <p:style>
+          <a:lnRef idx="2">
+            <a:schemeClr val="accent1">
+              <a:shade val="15000"/>
+            </a:schemeClr>
+          </a:lnRef>
+          <a:fillRef idx="1">
+            <a:schemeClr val="accent1"/>
+          </a:fillRef>
+          <a:effectRef idx="0">
+            <a:schemeClr val="accent1"/>
+          </a:effectRef>
+          <a:fontRef idx="minor">
+            <a:schemeClr val="lt1"/>
+          </a:fontRef>
+        </p:style>
+        <p:txBody>
+          <a:bodyPr rtlCol="0" anchor="ctr"/>
+          <a:lstStyle/>
+          <a:p>
+            <a:pPr algn="ctr"/>
+            <a:endParaRPr lang="en-US"/>
+          </a:p>
+        </p:txBody>
+      </p:sp>
+      <p:sp>
+        <p:nvSpPr>
+          <p:cNvPr id="31" name="Navigation Panel Left Side">
+            <a:extLst>
+              <a:ext uri="{FF2B5EF4-FFF2-40B4-BE49-F238E27FC236}">
+                <a16:creationId xmlns:a16="http://schemas.microsoft.com/office/drawing/2014/main" id="{FF42E2FC-A9C7-CA34-5EA0-AB6F50F2B446}"/>
+              </a:ext>
+            </a:extLst>
+          </p:cNvPr>
+          <p:cNvSpPr/>
+          <p:nvPr/>
+        </p:nvSpPr>
+        <p:spPr>
+          <a:xfrm>
+            <a:off x="44814" y="559788"/>
+            <a:ext cx="1458166" cy="5297212"/>
+          </a:xfrm>
+          <a:prstGeom prst="roundRect">
+            <a:avLst>
+              <a:gd name="adj" fmla="val 8300"/>
+            </a:avLst>
+          </a:prstGeom>
+          <a:solidFill>
+            <a:schemeClr val="bg1"/>
+          </a:solidFill>
+          <a:ln>
+            <a:noFill/>
+          </a:ln>
+          <a:effectLst>
+            <a:outerShdw blurRad="50800" dist="38100" dir="10800000" algn="r" rotWithShape="0">
+              <a:prstClr val="black">
+                <a:alpha val="40000"/>
+              </a:prstClr>
+            </a:outerShdw>
+          </a:effectLst>
+        </p:spPr>
+        <p:style>
+          <a:lnRef idx="2">
+            <a:schemeClr val="accent1">
+              <a:shade val="15000"/>
+            </a:schemeClr>
+          </a:lnRef>
+          <a:fillRef idx="1">
+            <a:schemeClr val="accent1"/>
+          </a:fillRef>
+          <a:effectRef idx="0">
+            <a:schemeClr val="accent1"/>
+          </a:effectRef>
+          <a:fontRef idx="minor">
+            <a:schemeClr val="lt1"/>
+          </a:fontRef>
+        </p:style>
+        <p:txBody>
+          <a:bodyPr rtlCol="0" anchor="ctr"/>
+          <a:lstStyle/>
+          <a:p>
+            <a:pPr algn="ctr"/>
+            <a:endParaRPr lang="en-US"/>
+          </a:p>
+        </p:txBody>
+      </p:sp>
+      <p:sp>
+        <p:nvSpPr>
+          <p:cNvPr id="32" name="Navigation Panel Right Side">
+            <a:extLst>
+              <a:ext uri="{FF2B5EF4-FFF2-40B4-BE49-F238E27FC236}">
+                <a16:creationId xmlns:a16="http://schemas.microsoft.com/office/drawing/2014/main" id="{0499EFA2-8BA3-E5AA-AA89-FEB09FBA66CE}"/>
+              </a:ext>
+            </a:extLst>
+          </p:cNvPr>
+          <p:cNvSpPr/>
+          <p:nvPr/>
+        </p:nvSpPr>
+        <p:spPr>
+          <a:xfrm>
+            <a:off x="966952" y="559788"/>
+            <a:ext cx="572262" cy="5297212"/>
+          </a:xfrm>
+          <a:prstGeom prst="roundRect">
+            <a:avLst/>
+          </a:prstGeom>
+          <a:solidFill>
+            <a:schemeClr val="bg1"/>
+          </a:solidFill>
+          <a:ln>
+            <a:noFill/>
+          </a:ln>
+          <a:effectLst/>
+        </p:spPr>
+        <p:style>
+          <a:lnRef idx="2">
+            <a:schemeClr val="accent1">
+              <a:shade val="15000"/>
+            </a:schemeClr>
+          </a:lnRef>
+          <a:fillRef idx="1">
+            <a:schemeClr val="accent1"/>
+          </a:fillRef>
+          <a:effectRef idx="0">
+            <a:schemeClr val="accent1"/>
+          </a:effectRef>
+          <a:fontRef idx="minor">
+            <a:schemeClr val="lt1"/>
+          </a:fontRef>
+        </p:style>
+        <p:txBody>
+          <a:bodyPr rtlCol="0" anchor="ctr"/>
+          <a:lstStyle/>
+          <a:p>
+            <a:pPr algn="ctr"/>
+            <a:endParaRPr lang="en-US"/>
+          </a:p>
+        </p:txBody>
+      </p:sp>
+      <p:sp>
+        <p:nvSpPr>
+          <p:cNvPr id="34" name="Total Card">
+            <a:extLst>
+              <a:ext uri="{FF2B5EF4-FFF2-40B4-BE49-F238E27FC236}">
+                <a16:creationId xmlns:a16="http://schemas.microsoft.com/office/drawing/2014/main" id="{FCD43CFD-DC01-C617-51DA-D908F7D2D61B}"/>
+              </a:ext>
+            </a:extLst>
+          </p:cNvPr>
+          <p:cNvSpPr/>
+          <p:nvPr/>
+        </p:nvSpPr>
+        <p:spPr>
+          <a:xfrm>
+            <a:off x="1703496" y="1246255"/>
+            <a:ext cx="2291255" cy="1097280"/>
+          </a:xfrm>
+          <a:prstGeom prst="roundRect">
+            <a:avLst>
+              <a:gd name="adj" fmla="val 10000"/>
+            </a:avLst>
+          </a:prstGeom>
+          <a:solidFill>
+            <a:srgbClr val="7030A0"/>
+          </a:solidFill>
+          <a:ln>
+            <a:noFill/>
+          </a:ln>
+          <a:effectLst>
+            <a:outerShdw blurRad="50800" dist="76200" dir="8100000" algn="tr" rotWithShape="0">
+              <a:prstClr val="black">
+                <a:alpha val="40000"/>
+              </a:prstClr>
+            </a:outerShdw>
+          </a:effectLst>
+        </p:spPr>
+        <p:style>
+          <a:lnRef idx="2">
+            <a:schemeClr val="accent1">
+              <a:shade val="15000"/>
+            </a:schemeClr>
+          </a:lnRef>
+          <a:fillRef idx="1">
+            <a:schemeClr val="accent1"/>
+          </a:fillRef>
+          <a:effectRef idx="0">
+            <a:schemeClr val="accent1"/>
+          </a:effectRef>
+          <a:fontRef idx="minor">
+            <a:schemeClr val="lt1"/>
+          </a:fontRef>
+        </p:style>
+        <p:txBody>
+          <a:bodyPr rtlCol="0" anchor="ctr"/>
+          <a:lstStyle/>
+          <a:p>
+            <a:pPr algn="ctr"/>
+            <a:endParaRPr lang="en-US"/>
+          </a:p>
+        </p:txBody>
+      </p:sp>
+      <p:sp>
+        <p:nvSpPr>
+          <p:cNvPr id="35" name="Province Card">
+            <a:extLst>
+              <a:ext uri="{FF2B5EF4-FFF2-40B4-BE49-F238E27FC236}">
+                <a16:creationId xmlns:a16="http://schemas.microsoft.com/office/drawing/2014/main" id="{A2DCAF9E-70F0-69C2-3B03-5B7391C30374}"/>
+              </a:ext>
+            </a:extLst>
+          </p:cNvPr>
+          <p:cNvSpPr/>
+          <p:nvPr/>
+        </p:nvSpPr>
+        <p:spPr>
+          <a:xfrm>
+            <a:off x="1703496" y="2479390"/>
+            <a:ext cx="2291255" cy="1387364"/>
+          </a:xfrm>
+          <a:prstGeom prst="roundRect">
+            <a:avLst>
+              <a:gd name="adj" fmla="val 8368"/>
+            </a:avLst>
+          </a:prstGeom>
+          <a:solidFill>
+            <a:schemeClr val="bg1"/>
+          </a:solidFill>
+          <a:ln>
+            <a:noFill/>
+          </a:ln>
+          <a:effectLst/>
+        </p:spPr>
+        <p:style>
+          <a:lnRef idx="2">
+            <a:schemeClr val="accent1">
+              <a:shade val="15000"/>
+            </a:schemeClr>
+          </a:lnRef>
+          <a:fillRef idx="1">
+            <a:schemeClr val="accent1"/>
+          </a:fillRef>
+          <a:effectRef idx="0">
+            <a:schemeClr val="accent1"/>
+          </a:effectRef>
+          <a:fontRef idx="minor">
+            <a:schemeClr val="lt1"/>
+          </a:fontRef>
+        </p:style>
+        <p:txBody>
+          <a:bodyPr rtlCol="0" anchor="ctr"/>
+          <a:lstStyle/>
+          <a:p>
+            <a:pPr algn="ctr"/>
+            <a:endParaRPr lang="en-US"/>
+          </a:p>
+        </p:txBody>
+      </p:sp>
+      <p:sp>
+        <p:nvSpPr>
+          <p:cNvPr id="36" name="Postcode Card">
+            <a:extLst>
+              <a:ext uri="{FF2B5EF4-FFF2-40B4-BE49-F238E27FC236}">
+                <a16:creationId xmlns:a16="http://schemas.microsoft.com/office/drawing/2014/main" id="{125F922C-7925-92FC-8D9D-9FBCD1E762F4}"/>
+              </a:ext>
+            </a:extLst>
+          </p:cNvPr>
+          <p:cNvSpPr/>
+          <p:nvPr/>
+        </p:nvSpPr>
+        <p:spPr>
+          <a:xfrm>
+            <a:off x="1671144" y="3983418"/>
+            <a:ext cx="6803136" cy="1873582"/>
+          </a:xfrm>
+          <a:prstGeom prst="roundRect">
+            <a:avLst>
+              <a:gd name="adj" fmla="val 8723"/>
+            </a:avLst>
+          </a:prstGeom>
+          <a:solidFill>
+            <a:schemeClr val="bg1"/>
+          </a:solidFill>
+          <a:ln>
+            <a:noFill/>
+          </a:ln>
+        </p:spPr>
+        <p:style>
+          <a:lnRef idx="2">
+            <a:schemeClr val="accent1">
+              <a:shade val="15000"/>
+            </a:schemeClr>
+          </a:lnRef>
+          <a:fillRef idx="1">
+            <a:schemeClr val="accent1"/>
+          </a:fillRef>
+          <a:effectRef idx="0">
+            <a:schemeClr val="accent1"/>
+          </a:effectRef>
+          <a:fontRef idx="minor">
+            <a:schemeClr val="lt1"/>
+          </a:fontRef>
+        </p:style>
+        <p:txBody>
+          <a:bodyPr rtlCol="0" anchor="ctr"/>
+          <a:lstStyle/>
+          <a:p>
+            <a:pPr algn="ctr"/>
+            <a:endParaRPr lang="en-US"/>
+          </a:p>
+        </p:txBody>
+      </p:sp>
+      <p:sp>
+        <p:nvSpPr>
+          <p:cNvPr id="37" name="District Card">
+            <a:extLst>
+              <a:ext uri="{FF2B5EF4-FFF2-40B4-BE49-F238E27FC236}">
+                <a16:creationId xmlns:a16="http://schemas.microsoft.com/office/drawing/2014/main" id="{A76EAB3C-E955-0C68-E28D-3C41C3C2CCE1}"/>
+              </a:ext>
+            </a:extLst>
+          </p:cNvPr>
+          <p:cNvSpPr/>
+          <p:nvPr/>
+        </p:nvSpPr>
+        <p:spPr>
+          <a:xfrm>
+            <a:off x="4142224" y="1246255"/>
+            <a:ext cx="3200400" cy="2620499"/>
+          </a:xfrm>
+          <a:prstGeom prst="roundRect">
+            <a:avLst>
+              <a:gd name="adj" fmla="val 5115"/>
+            </a:avLst>
+          </a:prstGeom>
+          <a:solidFill>
+            <a:schemeClr val="bg1"/>
+          </a:solidFill>
+          <a:ln>
+            <a:noFill/>
+          </a:ln>
+          <a:effectLst/>
+        </p:spPr>
+        <p:style>
+          <a:lnRef idx="2">
+            <a:schemeClr val="accent1">
+              <a:shade val="15000"/>
+            </a:schemeClr>
+          </a:lnRef>
+          <a:fillRef idx="1">
+            <a:schemeClr val="accent1"/>
+          </a:fillRef>
+          <a:effectRef idx="0">
+            <a:schemeClr val="accent1"/>
+          </a:effectRef>
+          <a:fontRef idx="minor">
+            <a:schemeClr val="lt1"/>
+          </a:fontRef>
+        </p:style>
+        <p:txBody>
+          <a:bodyPr rtlCol="0" anchor="ctr"/>
+          <a:lstStyle/>
+          <a:p>
+            <a:pPr algn="ctr"/>
+            <a:endParaRPr lang="en-US"/>
+          </a:p>
+        </p:txBody>
+      </p:sp>
+      <p:sp>
+        <p:nvSpPr>
+          <p:cNvPr id="2" name="District Card">
+            <a:extLst>
+              <a:ext uri="{FF2B5EF4-FFF2-40B4-BE49-F238E27FC236}">
+                <a16:creationId xmlns:a16="http://schemas.microsoft.com/office/drawing/2014/main" id="{5DD857F2-0BBC-4007-2509-B3035B1ADB09}"/>
+              </a:ext>
+            </a:extLst>
+          </p:cNvPr>
+          <p:cNvSpPr/>
+          <p:nvPr/>
+        </p:nvSpPr>
+        <p:spPr>
+          <a:xfrm>
+            <a:off x="7459191" y="1246255"/>
+            <a:ext cx="3200400" cy="2620499"/>
+          </a:xfrm>
+          <a:prstGeom prst="roundRect">
+            <a:avLst>
+              <a:gd name="adj" fmla="val 5115"/>
+            </a:avLst>
+          </a:prstGeom>
+          <a:solidFill>
+            <a:schemeClr val="bg1"/>
+          </a:solidFill>
+          <a:ln>
+            <a:noFill/>
+          </a:ln>
+          <a:effectLst/>
+        </p:spPr>
+        <p:style>
+          <a:lnRef idx="2">
+            <a:schemeClr val="accent1">
+              <a:shade val="15000"/>
+            </a:schemeClr>
+          </a:lnRef>
+          <a:fillRef idx="1">
+            <a:schemeClr val="accent1"/>
+          </a:fillRef>
+          <a:effectRef idx="0">
+            <a:schemeClr val="accent1"/>
+          </a:effectRef>
+          <a:fontRef idx="minor">
+            <a:schemeClr val="lt1"/>
+          </a:fontRef>
+        </p:style>
+        <p:txBody>
+          <a:bodyPr rtlCol="0" anchor="ctr"/>
+          <a:lstStyle/>
+          <a:p>
+            <a:pPr algn="ctr"/>
+            <a:endParaRPr lang="en-US"/>
+          </a:p>
+        </p:txBody>
+      </p:sp>
+      <p:sp>
+        <p:nvSpPr>
+          <p:cNvPr id="3" name="Postcode Card">
+            <a:extLst>
+              <a:ext uri="{FF2B5EF4-FFF2-40B4-BE49-F238E27FC236}">
+                <a16:creationId xmlns:a16="http://schemas.microsoft.com/office/drawing/2014/main" id="{159EF9D3-463A-FB4C-565B-AA61C7B99300}"/>
+              </a:ext>
+            </a:extLst>
+          </p:cNvPr>
+          <p:cNvSpPr/>
+          <p:nvPr/>
+        </p:nvSpPr>
+        <p:spPr>
+          <a:xfrm>
+            <a:off x="8606210" y="3983418"/>
+            <a:ext cx="2053381" cy="1873582"/>
+          </a:xfrm>
+          <a:prstGeom prst="roundRect">
+            <a:avLst>
+              <a:gd name="adj" fmla="val 8723"/>
+            </a:avLst>
+          </a:prstGeom>
+          <a:solidFill>
+            <a:schemeClr val="bg1"/>
+          </a:solidFill>
+          <a:ln>
+            <a:noFill/>
+          </a:ln>
+        </p:spPr>
+        <p:style>
+          <a:lnRef idx="2">
+            <a:schemeClr val="accent1">
+              <a:shade val="15000"/>
+            </a:schemeClr>
+          </a:lnRef>
+          <a:fillRef idx="1">
+            <a:schemeClr val="accent1"/>
+          </a:fillRef>
+          <a:effectRef idx="0">
+            <a:schemeClr val="accent1"/>
+          </a:effectRef>
+          <a:fontRef idx="minor">
+            <a:schemeClr val="lt1"/>
+          </a:fontRef>
+        </p:style>
+        <p:txBody>
+          <a:bodyPr rtlCol="0" anchor="ctr"/>
+          <a:lstStyle/>
+          <a:p>
+            <a:pPr algn="ctr"/>
+            <a:endParaRPr lang="en-US"/>
+          </a:p>
+        </p:txBody>
+      </p:sp>
+    </p:spTree>
+    <p:extLst>
+      <p:ext uri="{BB962C8B-B14F-4D97-AF65-F5344CB8AC3E}">
+        <p14:creationId xmlns:p14="http://schemas.microsoft.com/office/powerpoint/2010/main" val="4033107535"/>
       </p:ext>
     </p:extLst>
   </p:cSld>

</xml_diff>

<commit_message>
All analysis pages completed except for new Home Page addition. As I want a summary page to show. I'll look at the Power BI: The art of making incredible tools for inspiration for it.
</commit_message>
<xml_diff>
--- a/Background/Backgrounds for Report.pptx
+++ b/Background/Backgrounds for Report.pptx
@@ -7,6 +7,8 @@
   <p:sldIdLst>
     <p:sldId id="256" r:id="rId2"/>
     <p:sldId id="257" r:id="rId3"/>
+    <p:sldId id="258" r:id="rId4"/>
+    <p:sldId id="259" r:id="rId5"/>
   </p:sldIdLst>
   <p:sldSz cx="10729913" cy="6035675"/>
   <p:notesSz cx="6858000" cy="9144000"/>
@@ -116,7 +118,7 @@
 <file path=ppt/revisionInfo.xml><?xml version="1.0" encoding="utf-8"?>
 <p1510:revInfo xmlns:a="http://schemas.openxmlformats.org/drawingml/2006/main" xmlns:r="http://schemas.openxmlformats.org/officeDocument/2006/relationships" xmlns:p1510="http://schemas.microsoft.com/office/powerpoint/2015/10/main">
   <p1510:revLst>
-    <p1510:client id="{BD549498-3C09-4EB4-B4FE-2C5D88A772BF}" v="30" dt="2023-08-01T02:17:59.546"/>
+    <p1510:client id="{BD549498-3C09-4EB4-B4FE-2C5D88A772BF}" v="36" dt="2023-08-02T09:32:55.379"/>
   </p1510:revLst>
 </p1510:revInfo>
 </file>
@@ -125,13 +127,13 @@
 <pc:chgInfo xmlns:a="http://schemas.openxmlformats.org/drawingml/2006/main" xmlns:r="http://schemas.openxmlformats.org/officeDocument/2006/relationships" xmlns:ac="http://schemas.microsoft.com/office/drawing/2013/main/command" xmlns:pc="http://schemas.microsoft.com/office/powerpoint/2013/main/command">
   <pc:docChgLst>
     <pc:chgData name="Andrew Hubbard" userId="efcfa07183130be2" providerId="LiveId" clId="{BD549498-3C09-4EB4-B4FE-2C5D88A772BF}"/>
-    <pc:docChg chg="undo custSel addSld modSld">
-      <pc:chgData name="Andrew Hubbard" userId="efcfa07183130be2" providerId="LiveId" clId="{BD549498-3C09-4EB4-B4FE-2C5D88A772BF}" dt="2023-08-01T02:18:19.188" v="242" actId="14100"/>
+    <pc:docChg chg="undo custSel addSld modSld sldOrd">
+      <pc:chgData name="Andrew Hubbard" userId="efcfa07183130be2" providerId="LiveId" clId="{BD549498-3C09-4EB4-B4FE-2C5D88A772BF}" dt="2023-08-02T09:33:10.518" v="321" actId="555"/>
       <pc:docMkLst>
         <pc:docMk/>
       </pc:docMkLst>
       <pc:sldChg chg="addSp delSp modSp mod setBg">
-        <pc:chgData name="Andrew Hubbard" userId="efcfa07183130be2" providerId="LiveId" clId="{BD549498-3C09-4EB4-B4FE-2C5D88A772BF}" dt="2023-07-31T02:59:17.532" v="234" actId="207"/>
+        <pc:chgData name="Andrew Hubbard" userId="efcfa07183130be2" providerId="LiveId" clId="{BD549498-3C09-4EB4-B4FE-2C5D88A772BF}" dt="2023-08-01T10:53:00.182" v="248" actId="14100"/>
         <pc:sldMkLst>
           <pc:docMk/>
           <pc:sldMk cId="1767767614" sldId="256"/>
@@ -145,7 +147,7 @@
           </ac:spMkLst>
         </pc:spChg>
         <pc:spChg chg="add mod">
-          <ac:chgData name="Andrew Hubbard" userId="efcfa07183130be2" providerId="LiveId" clId="{BD549498-3C09-4EB4-B4FE-2C5D88A772BF}" dt="2023-07-29T03:37:14.065" v="210" actId="553"/>
+          <ac:chgData name="Andrew Hubbard" userId="efcfa07183130be2" providerId="LiveId" clId="{BD549498-3C09-4EB4-B4FE-2C5D88A772BF}" dt="2023-08-01T10:52:20.911" v="243" actId="553"/>
           <ac:spMkLst>
             <pc:docMk/>
             <pc:sldMk cId="1767767614" sldId="256"/>
@@ -153,7 +155,7 @@
           </ac:spMkLst>
         </pc:spChg>
         <pc:spChg chg="mod">
-          <ac:chgData name="Andrew Hubbard" userId="efcfa07183130be2" providerId="LiveId" clId="{BD549498-3C09-4EB4-B4FE-2C5D88A772BF}" dt="2023-07-28T09:18:04.771" v="181" actId="962"/>
+          <ac:chgData name="Andrew Hubbard" userId="efcfa07183130be2" providerId="LiveId" clId="{BD549498-3C09-4EB4-B4FE-2C5D88A772BF}" dt="2023-08-01T10:53:00.182" v="248" actId="14100"/>
           <ac:spMkLst>
             <pc:docMk/>
             <pc:sldMk cId="1767767614" sldId="256"/>
@@ -161,7 +163,7 @@
           </ac:spMkLst>
         </pc:spChg>
         <pc:spChg chg="mod">
-          <ac:chgData name="Andrew Hubbard" userId="efcfa07183130be2" providerId="LiveId" clId="{BD549498-3C09-4EB4-B4FE-2C5D88A772BF}" dt="2023-07-28T09:17:56.475" v="180" actId="962"/>
+          <ac:chgData name="Andrew Hubbard" userId="efcfa07183130be2" providerId="LiveId" clId="{BD549498-3C09-4EB4-B4FE-2C5D88A772BF}" dt="2023-08-01T10:52:44.714" v="246" actId="552"/>
           <ac:spMkLst>
             <pc:docMk/>
             <pc:sldMk cId="1767767614" sldId="256"/>
@@ -169,7 +171,7 @@
           </ac:spMkLst>
         </pc:spChg>
         <pc:spChg chg="mod">
-          <ac:chgData name="Andrew Hubbard" userId="efcfa07183130be2" providerId="LiveId" clId="{BD549498-3C09-4EB4-B4FE-2C5D88A772BF}" dt="2023-07-31T02:50:56.573" v="212" actId="207"/>
+          <ac:chgData name="Andrew Hubbard" userId="efcfa07183130be2" providerId="LiveId" clId="{BD549498-3C09-4EB4-B4FE-2C5D88A772BF}" dt="2023-08-01T10:52:30.423" v="244" actId="553"/>
           <ac:spMkLst>
             <pc:docMk/>
             <pc:sldMk cId="1767767614" sldId="256"/>
@@ -177,7 +179,7 @@
           </ac:spMkLst>
         </pc:spChg>
         <pc:spChg chg="mod">
-          <ac:chgData name="Andrew Hubbard" userId="efcfa07183130be2" providerId="LiveId" clId="{BD549498-3C09-4EB4-B4FE-2C5D88A772BF}" dt="2023-07-29T01:03:44.491" v="190" actId="555"/>
+          <ac:chgData name="Andrew Hubbard" userId="efcfa07183130be2" providerId="LiveId" clId="{BD549498-3C09-4EB4-B4FE-2C5D88A772BF}" dt="2023-08-01T10:52:44.714" v="246" actId="552"/>
           <ac:spMkLst>
             <pc:docMk/>
             <pc:sldMk cId="1767767614" sldId="256"/>
@@ -193,7 +195,7 @@
           </ac:spMkLst>
         </pc:spChg>
         <pc:spChg chg="mod ord">
-          <ac:chgData name="Andrew Hubbard" userId="efcfa07183130be2" providerId="LiveId" clId="{BD549498-3C09-4EB4-B4FE-2C5D88A772BF}" dt="2023-07-28T09:18:22.543" v="182" actId="962"/>
+          <ac:chgData name="Andrew Hubbard" userId="efcfa07183130be2" providerId="LiveId" clId="{BD549498-3C09-4EB4-B4FE-2C5D88A772BF}" dt="2023-08-01T10:52:30.423" v="244" actId="553"/>
           <ac:spMkLst>
             <pc:docMk/>
             <pc:sldMk cId="1767767614" sldId="256"/>
@@ -242,13 +244,21 @@
         </pc:spChg>
       </pc:sldChg>
       <pc:sldChg chg="addSp modSp add mod">
-        <pc:chgData name="Andrew Hubbard" userId="efcfa07183130be2" providerId="LiveId" clId="{BD549498-3C09-4EB4-B4FE-2C5D88A772BF}" dt="2023-08-01T02:18:19.188" v="242" actId="14100"/>
+        <pc:chgData name="Andrew Hubbard" userId="efcfa07183130be2" providerId="LiveId" clId="{BD549498-3C09-4EB4-B4FE-2C5D88A772BF}" dt="2023-08-01T10:55:19.350" v="255" actId="552"/>
         <pc:sldMkLst>
           <pc:docMk/>
           <pc:sldMk cId="4033107535" sldId="257"/>
         </pc:sldMkLst>
+        <pc:spChg chg="mod">
+          <ac:chgData name="Andrew Hubbard" userId="efcfa07183130be2" providerId="LiveId" clId="{BD549498-3C09-4EB4-B4FE-2C5D88A772BF}" dt="2023-08-01T10:55:03.755" v="254" actId="553"/>
+          <ac:spMkLst>
+            <pc:docMk/>
+            <pc:sldMk cId="4033107535" sldId="257"/>
+            <ac:spMk id="2" creationId="{5DD857F2-0BBC-4007-2509-B3035B1ADB09}"/>
+          </ac:spMkLst>
+        </pc:spChg>
         <pc:spChg chg="add mod">
-          <ac:chgData name="Andrew Hubbard" userId="efcfa07183130be2" providerId="LiveId" clId="{BD549498-3C09-4EB4-B4FE-2C5D88A772BF}" dt="2023-08-01T02:18:19.188" v="242" actId="14100"/>
+          <ac:chgData name="Andrew Hubbard" userId="efcfa07183130be2" providerId="LiveId" clId="{BD549498-3C09-4EB4-B4FE-2C5D88A772BF}" dt="2023-08-01T10:55:03.755" v="254" actId="553"/>
           <ac:spMkLst>
             <pc:docMk/>
             <pc:sldMk cId="4033107535" sldId="257"/>
@@ -256,10 +266,152 @@
           </ac:spMkLst>
         </pc:spChg>
         <pc:spChg chg="mod">
+          <ac:chgData name="Andrew Hubbard" userId="efcfa07183130be2" providerId="LiveId" clId="{BD549498-3C09-4EB4-B4FE-2C5D88A772BF}" dt="2023-08-01T10:53:40.099" v="252" actId="14100"/>
+          <ac:spMkLst>
+            <pc:docMk/>
+            <pc:sldMk cId="4033107535" sldId="257"/>
+            <ac:spMk id="28" creationId="{DF52F5A7-FD76-D141-0BA2-536B5B2088BB}"/>
+          </ac:spMkLst>
+        </pc:spChg>
+        <pc:spChg chg="mod">
+          <ac:chgData name="Andrew Hubbard" userId="efcfa07183130be2" providerId="LiveId" clId="{BD549498-3C09-4EB4-B4FE-2C5D88A772BF}" dt="2023-08-01T10:55:19.350" v="255" actId="552"/>
+          <ac:spMkLst>
+            <pc:docMk/>
+            <pc:sldMk cId="4033107535" sldId="257"/>
+            <ac:spMk id="29" creationId="{C9A546F3-70CF-FA10-5E2F-E92985A80D82}"/>
+          </ac:spMkLst>
+        </pc:spChg>
+        <pc:spChg chg="mod">
+          <ac:chgData name="Andrew Hubbard" userId="efcfa07183130be2" providerId="LiveId" clId="{BD549498-3C09-4EB4-B4FE-2C5D88A772BF}" dt="2023-08-01T10:53:35.521" v="251" actId="553"/>
+          <ac:spMkLst>
+            <pc:docMk/>
+            <pc:sldMk cId="4033107535" sldId="257"/>
+            <ac:spMk id="30" creationId="{583456BB-E255-CD32-1B89-33C9864B5F33}"/>
+          </ac:spMkLst>
+        </pc:spChg>
+        <pc:spChg chg="mod">
+          <ac:chgData name="Andrew Hubbard" userId="efcfa07183130be2" providerId="LiveId" clId="{BD549498-3C09-4EB4-B4FE-2C5D88A772BF}" dt="2023-08-01T10:55:19.350" v="255" actId="552"/>
+          <ac:spMkLst>
+            <pc:docMk/>
+            <pc:sldMk cId="4033107535" sldId="257"/>
+            <ac:spMk id="31" creationId="{FF42E2FC-A9C7-CA34-5EA0-AB6F50F2B446}"/>
+          </ac:spMkLst>
+        </pc:spChg>
+        <pc:spChg chg="mod">
+          <ac:chgData name="Andrew Hubbard" userId="efcfa07183130be2" providerId="LiveId" clId="{BD549498-3C09-4EB4-B4FE-2C5D88A772BF}" dt="2023-08-01T10:55:03.755" v="254" actId="553"/>
+          <ac:spMkLst>
+            <pc:docMk/>
+            <pc:sldMk cId="4033107535" sldId="257"/>
+            <ac:spMk id="33" creationId="{65536100-CA4D-75FB-4E79-36F3236061D4}"/>
+          </ac:spMkLst>
+        </pc:spChg>
+        <pc:spChg chg="mod">
           <ac:chgData name="Andrew Hubbard" userId="efcfa07183130be2" providerId="LiveId" clId="{BD549498-3C09-4EB4-B4FE-2C5D88A772BF}" dt="2023-08-01T02:17:46.993" v="236" actId="14100"/>
           <ac:spMkLst>
             <pc:docMk/>
             <pc:sldMk cId="4033107535" sldId="257"/>
+            <ac:spMk id="36" creationId="{125F922C-7925-92FC-8D9D-9FBCD1E762F4}"/>
+          </ac:spMkLst>
+        </pc:spChg>
+      </pc:sldChg>
+      <pc:sldChg chg="addSp delSp modSp add mod ord">
+        <pc:chgData name="Andrew Hubbard" userId="efcfa07183130be2" providerId="LiveId" clId="{BD549498-3C09-4EB4-B4FE-2C5D88A772BF}" dt="2023-08-02T09:33:10.518" v="321" actId="555"/>
+        <pc:sldMkLst>
+          <pc:docMk/>
+          <pc:sldMk cId="3211582888" sldId="258"/>
+        </pc:sldMkLst>
+        <pc:spChg chg="mod">
+          <ac:chgData name="Andrew Hubbard" userId="efcfa07183130be2" providerId="LiveId" clId="{BD549498-3C09-4EB4-B4FE-2C5D88A772BF}" dt="2023-08-02T09:33:10.518" v="321" actId="555"/>
+          <ac:spMkLst>
+            <pc:docMk/>
+            <pc:sldMk cId="3211582888" sldId="258"/>
+            <ac:spMk id="2" creationId="{5DD857F2-0BBC-4007-2509-B3035B1ADB09}"/>
+          </ac:spMkLst>
+        </pc:spChg>
+        <pc:spChg chg="add mod">
+          <ac:chgData name="Andrew Hubbard" userId="efcfa07183130be2" providerId="LiveId" clId="{BD549498-3C09-4EB4-B4FE-2C5D88A772BF}" dt="2023-08-02T09:33:04.133" v="320" actId="552"/>
+          <ac:spMkLst>
+            <pc:docMk/>
+            <pc:sldMk cId="3211582888" sldId="258"/>
+            <ac:spMk id="3" creationId="{CC39EFDA-EAD5-8822-7AB2-5689E4DF52D1}"/>
+          </ac:spMkLst>
+        </pc:spChg>
+        <pc:spChg chg="add del mod">
+          <ac:chgData name="Andrew Hubbard" userId="efcfa07183130be2" providerId="LiveId" clId="{BD549498-3C09-4EB4-B4FE-2C5D88A772BF}" dt="2023-08-02T09:31:49.931" v="313" actId="478"/>
+          <ac:spMkLst>
+            <pc:docMk/>
+            <pc:sldMk cId="3211582888" sldId="258"/>
+            <ac:spMk id="4" creationId="{A3C73E89-9089-F55E-3075-90891D889B1B}"/>
+          </ac:spMkLst>
+        </pc:spChg>
+        <pc:spChg chg="add mod">
+          <ac:chgData name="Andrew Hubbard" userId="efcfa07183130be2" providerId="LiveId" clId="{BD549498-3C09-4EB4-B4FE-2C5D88A772BF}" dt="2023-08-02T09:33:10.518" v="321" actId="555"/>
+          <ac:spMkLst>
+            <pc:docMk/>
+            <pc:sldMk cId="3211582888" sldId="258"/>
+            <ac:spMk id="5" creationId="{B1DF29EB-26D3-E2B6-DFE0-2AB8B622FEE6}"/>
+          </ac:spMkLst>
+        </pc:spChg>
+        <pc:spChg chg="del">
+          <ac:chgData name="Andrew Hubbard" userId="efcfa07183130be2" providerId="LiveId" clId="{BD549498-3C09-4EB4-B4FE-2C5D88A772BF}" dt="2023-08-01T10:56:20.313" v="261" actId="478"/>
+          <ac:spMkLst>
+            <pc:docMk/>
+            <pc:sldMk cId="3211582888" sldId="258"/>
+            <ac:spMk id="34" creationId="{FCD43CFD-DC01-C617-51DA-D908F7D2D61B}"/>
+          </ac:spMkLst>
+        </pc:spChg>
+        <pc:spChg chg="del">
+          <ac:chgData name="Andrew Hubbard" userId="efcfa07183130be2" providerId="LiveId" clId="{BD549498-3C09-4EB4-B4FE-2C5D88A772BF}" dt="2023-08-01T10:56:19.666" v="260" actId="478"/>
+          <ac:spMkLst>
+            <pc:docMk/>
+            <pc:sldMk cId="3211582888" sldId="258"/>
+            <ac:spMk id="35" creationId="{A2DCAF9E-70F0-69C2-3B03-5B7391C30374}"/>
+          </ac:spMkLst>
+        </pc:spChg>
+        <pc:spChg chg="del mod">
+          <ac:chgData name="Andrew Hubbard" userId="efcfa07183130be2" providerId="LiveId" clId="{BD549498-3C09-4EB4-B4FE-2C5D88A772BF}" dt="2023-08-02T09:32:43.308" v="317" actId="478"/>
+          <ac:spMkLst>
+            <pc:docMk/>
+            <pc:sldMk cId="3211582888" sldId="258"/>
+            <ac:spMk id="36" creationId="{125F922C-7925-92FC-8D9D-9FBCD1E762F4}"/>
+          </ac:spMkLst>
+        </pc:spChg>
+        <pc:spChg chg="del">
+          <ac:chgData name="Andrew Hubbard" userId="efcfa07183130be2" providerId="LiveId" clId="{BD549498-3C09-4EB4-B4FE-2C5D88A772BF}" dt="2023-08-01T10:56:18.696" v="259" actId="478"/>
+          <ac:spMkLst>
+            <pc:docMk/>
+            <pc:sldMk cId="3211582888" sldId="258"/>
+            <ac:spMk id="37" creationId="{A76EAB3C-E955-0C68-E28D-3C41C3C2CCE1}"/>
+          </ac:spMkLst>
+        </pc:spChg>
+      </pc:sldChg>
+      <pc:sldChg chg="delSp modSp add mod">
+        <pc:chgData name="Andrew Hubbard" userId="efcfa07183130be2" providerId="LiveId" clId="{BD549498-3C09-4EB4-B4FE-2C5D88A772BF}" dt="2023-08-02T09:31:57.385" v="314" actId="14100"/>
+        <pc:sldMkLst>
+          <pc:docMk/>
+          <pc:sldMk cId="3995899697" sldId="259"/>
+        </pc:sldMkLst>
+        <pc:spChg chg="del">
+          <ac:chgData name="Andrew Hubbard" userId="efcfa07183130be2" providerId="LiveId" clId="{BD549498-3C09-4EB4-B4FE-2C5D88A772BF}" dt="2023-08-02T09:30:39.355" v="309" actId="478"/>
+          <ac:spMkLst>
+            <pc:docMk/>
+            <pc:sldMk cId="3995899697" sldId="259"/>
+            <ac:spMk id="2" creationId="{5DD857F2-0BBC-4007-2509-B3035B1ADB09}"/>
+          </ac:spMkLst>
+        </pc:spChg>
+        <pc:spChg chg="del">
+          <ac:chgData name="Andrew Hubbard" userId="efcfa07183130be2" providerId="LiveId" clId="{BD549498-3C09-4EB4-B4FE-2C5D88A772BF}" dt="2023-08-02T09:29:47.936" v="305" actId="478"/>
+          <ac:spMkLst>
+            <pc:docMk/>
+            <pc:sldMk cId="3995899697" sldId="259"/>
+            <ac:spMk id="3" creationId="{CC39EFDA-EAD5-8822-7AB2-5689E4DF52D1}"/>
+          </ac:spMkLst>
+        </pc:spChg>
+        <pc:spChg chg="mod">
+          <ac:chgData name="Andrew Hubbard" userId="efcfa07183130be2" providerId="LiveId" clId="{BD549498-3C09-4EB4-B4FE-2C5D88A772BF}" dt="2023-08-02T09:31:57.385" v="314" actId="14100"/>
+          <ac:spMkLst>
+            <pc:docMk/>
+            <pc:sldMk cId="3995899697" sldId="259"/>
             <ac:spMk id="36" creationId="{125F922C-7925-92FC-8D9D-9FBCD1E762F4}"/>
           </ac:spMkLst>
         </pc:spChg>
@@ -400,7 +552,7 @@
           <a:p>
             <a:fld id="{BC16F218-39A0-41C7-9739-6124B1EB9EBC}" type="datetimeFigureOut">
               <a:rPr lang="en-US" smtClean="0"/>
-              <a:t>8/1/2023</a:t>
+              <a:t>8/2/2023</a:t>
             </a:fld>
             <a:endParaRPr lang="en-US"/>
           </a:p>
@@ -570,7 +722,7 @@
           <a:p>
             <a:fld id="{BC16F218-39A0-41C7-9739-6124B1EB9EBC}" type="datetimeFigureOut">
               <a:rPr lang="en-US" smtClean="0"/>
-              <a:t>8/1/2023</a:t>
+              <a:t>8/2/2023</a:t>
             </a:fld>
             <a:endParaRPr lang="en-US"/>
           </a:p>
@@ -750,7 +902,7 @@
           <a:p>
             <a:fld id="{BC16F218-39A0-41C7-9739-6124B1EB9EBC}" type="datetimeFigureOut">
               <a:rPr lang="en-US" smtClean="0"/>
-              <a:t>8/1/2023</a:t>
+              <a:t>8/2/2023</a:t>
             </a:fld>
             <a:endParaRPr lang="en-US"/>
           </a:p>
@@ -920,7 +1072,7 @@
           <a:p>
             <a:fld id="{BC16F218-39A0-41C7-9739-6124B1EB9EBC}" type="datetimeFigureOut">
               <a:rPr lang="en-US" smtClean="0"/>
-              <a:t>8/1/2023</a:t>
+              <a:t>8/2/2023</a:t>
             </a:fld>
             <a:endParaRPr lang="en-US"/>
           </a:p>
@@ -1166,7 +1318,7 @@
           <a:p>
             <a:fld id="{BC16F218-39A0-41C7-9739-6124B1EB9EBC}" type="datetimeFigureOut">
               <a:rPr lang="en-US" smtClean="0"/>
-              <a:t>8/1/2023</a:t>
+              <a:t>8/2/2023</a:t>
             </a:fld>
             <a:endParaRPr lang="en-US"/>
           </a:p>
@@ -1398,7 +1550,7 @@
           <a:p>
             <a:fld id="{BC16F218-39A0-41C7-9739-6124B1EB9EBC}" type="datetimeFigureOut">
               <a:rPr lang="en-US" smtClean="0"/>
-              <a:t>8/1/2023</a:t>
+              <a:t>8/2/2023</a:t>
             </a:fld>
             <a:endParaRPr lang="en-US"/>
           </a:p>
@@ -1765,7 +1917,7 @@
           <a:p>
             <a:fld id="{BC16F218-39A0-41C7-9739-6124B1EB9EBC}" type="datetimeFigureOut">
               <a:rPr lang="en-US" smtClean="0"/>
-              <a:t>8/1/2023</a:t>
+              <a:t>8/2/2023</a:t>
             </a:fld>
             <a:endParaRPr lang="en-US"/>
           </a:p>
@@ -1883,7 +2035,7 @@
           <a:p>
             <a:fld id="{BC16F218-39A0-41C7-9739-6124B1EB9EBC}" type="datetimeFigureOut">
               <a:rPr lang="en-US" smtClean="0"/>
-              <a:t>8/1/2023</a:t>
+              <a:t>8/2/2023</a:t>
             </a:fld>
             <a:endParaRPr lang="en-US"/>
           </a:p>
@@ -1978,7 +2130,7 @@
           <a:p>
             <a:fld id="{BC16F218-39A0-41C7-9739-6124B1EB9EBC}" type="datetimeFigureOut">
               <a:rPr lang="en-US" smtClean="0"/>
-              <a:t>8/1/2023</a:t>
+              <a:t>8/2/2023</a:t>
             </a:fld>
             <a:endParaRPr lang="en-US"/>
           </a:p>
@@ -2255,7 +2407,7 @@
           <a:p>
             <a:fld id="{BC16F218-39A0-41C7-9739-6124B1EB9EBC}" type="datetimeFigureOut">
               <a:rPr lang="en-US" smtClean="0"/>
-              <a:t>8/1/2023</a:t>
+              <a:t>8/2/2023</a:t>
             </a:fld>
             <a:endParaRPr lang="en-US"/>
           </a:p>
@@ -2512,7 +2664,7 @@
           <a:p>
             <a:fld id="{BC16F218-39A0-41C7-9739-6124B1EB9EBC}" type="datetimeFigureOut">
               <a:rPr lang="en-US" smtClean="0"/>
-              <a:t>8/1/2023</a:t>
+              <a:t>8/2/2023</a:t>
             </a:fld>
             <a:endParaRPr lang="en-US"/>
           </a:p>
@@ -2725,7 +2877,7 @@
           <a:p>
             <a:fld id="{BC16F218-39A0-41C7-9739-6124B1EB9EBC}" type="datetimeFigureOut">
               <a:rPr lang="en-US" smtClean="0"/>
-              <a:t>8/1/2023</a:t>
+              <a:t>8/2/2023</a:t>
             </a:fld>
             <a:endParaRPr lang="en-US"/>
           </a:p>
@@ -3154,7 +3306,7 @@
         </p:nvSpPr>
         <p:spPr>
           <a:xfrm>
-            <a:off x="996853" y="559789"/>
+            <a:off x="1036891" y="559789"/>
             <a:ext cx="9622700" cy="538817"/>
           </a:xfrm>
           <a:prstGeom prst="roundRect">
@@ -3213,8 +3365,8 @@
         </p:nvSpPr>
         <p:spPr>
           <a:xfrm>
-            <a:off x="245844" y="89340"/>
-            <a:ext cx="10238225" cy="365760"/>
+            <a:off x="44814" y="89340"/>
+            <a:ext cx="10614778" cy="365760"/>
           </a:xfrm>
           <a:prstGeom prst="rect">
             <a:avLst/>
@@ -3265,7 +3417,7 @@
         </p:nvSpPr>
         <p:spPr>
           <a:xfrm>
-            <a:off x="110359" y="89340"/>
+            <a:off x="44814" y="89340"/>
             <a:ext cx="135485" cy="365760"/>
           </a:xfrm>
           <a:prstGeom prst="rect">
@@ -3317,7 +3469,7 @@
         </p:nvSpPr>
         <p:spPr>
           <a:xfrm>
-            <a:off x="10484069" y="89340"/>
+            <a:off x="10524106" y="89340"/>
             <a:ext cx="135485" cy="365760"/>
           </a:xfrm>
           <a:prstGeom prst="rect">
@@ -3803,7 +3955,7 @@
         </p:nvSpPr>
         <p:spPr>
           <a:xfrm>
-            <a:off x="996853" y="559789"/>
+            <a:off x="1036891" y="559789"/>
             <a:ext cx="9622700" cy="538817"/>
           </a:xfrm>
           <a:prstGeom prst="roundRect">
@@ -3862,8 +4014,8 @@
         </p:nvSpPr>
         <p:spPr>
           <a:xfrm>
-            <a:off x="245844" y="89340"/>
-            <a:ext cx="10238225" cy="365760"/>
+            <a:off x="44814" y="89340"/>
+            <a:ext cx="10614777" cy="365760"/>
           </a:xfrm>
           <a:prstGeom prst="rect">
             <a:avLst/>
@@ -3914,7 +4066,7 @@
         </p:nvSpPr>
         <p:spPr>
           <a:xfrm>
-            <a:off x="110359" y="89340"/>
+            <a:off x="44814" y="89340"/>
             <a:ext cx="135485" cy="365760"/>
           </a:xfrm>
           <a:prstGeom prst="rect">
@@ -3966,7 +4118,7 @@
         </p:nvSpPr>
         <p:spPr>
           <a:xfrm>
-            <a:off x="10484069" y="89340"/>
+            <a:off x="10524106" y="89340"/>
             <a:ext cx="135485" cy="365760"/>
           </a:xfrm>
           <a:prstGeom prst="rect">
@@ -4456,6 +4608,961 @@
     <p:extLst>
       <p:ext uri="{BB962C8B-B14F-4D97-AF65-F5344CB8AC3E}">
         <p14:creationId xmlns:p14="http://schemas.microsoft.com/office/powerpoint/2010/main" val="4033107535"/>
+      </p:ext>
+    </p:extLst>
+  </p:cSld>
+  <p:clrMapOvr>
+    <a:masterClrMapping/>
+  </p:clrMapOvr>
+</p:sld>
+</file>
+
+<file path=ppt/slides/slide3.xml><?xml version="1.0" encoding="utf-8"?>
+<p:sld xmlns:a="http://schemas.openxmlformats.org/drawingml/2006/main" xmlns:r="http://schemas.openxmlformats.org/officeDocument/2006/relationships" xmlns:p="http://schemas.openxmlformats.org/presentationml/2006/main">
+  <p:cSld>
+    <p:bg>
+      <p:bgPr>
+        <a:solidFill>
+          <a:schemeClr val="bg1">
+            <a:lumMod val="95000"/>
+          </a:schemeClr>
+        </a:solidFill>
+        <a:effectLst/>
+      </p:bgPr>
+    </p:bg>
+    <p:spTree>
+      <p:nvGrpSpPr>
+        <p:cNvPr id="1" name=""/>
+        <p:cNvGrpSpPr/>
+        <p:nvPr/>
+      </p:nvGrpSpPr>
+      <p:grpSpPr>
+        <a:xfrm>
+          <a:off x="0" y="0"/>
+          <a:ext cx="0" cy="0"/>
+          <a:chOff x="0" y="0"/>
+          <a:chExt cx="0" cy="0"/>
+        </a:xfrm>
+      </p:grpSpPr>
+      <p:sp>
+        <p:nvSpPr>
+          <p:cNvPr id="33" name="Slicer Panel Background">
+            <a:extLst>
+              <a:ext uri="{FF2B5EF4-FFF2-40B4-BE49-F238E27FC236}">
+                <a16:creationId xmlns:a16="http://schemas.microsoft.com/office/drawing/2014/main" id="{65536100-CA4D-75FB-4E79-36F3236061D4}"/>
+              </a:ext>
+            </a:extLst>
+          </p:cNvPr>
+          <p:cNvSpPr/>
+          <p:nvPr/>
+        </p:nvSpPr>
+        <p:spPr>
+          <a:xfrm>
+            <a:off x="1036891" y="559789"/>
+            <a:ext cx="9622700" cy="538817"/>
+          </a:xfrm>
+          <a:prstGeom prst="roundRect">
+            <a:avLst/>
+          </a:prstGeom>
+          <a:solidFill>
+            <a:schemeClr val="bg1"/>
+          </a:solidFill>
+          <a:ln>
+            <a:noFill/>
+          </a:ln>
+          <a:effectLst>
+            <a:outerShdw blurRad="50800" dist="38100" dir="5400000" algn="t" rotWithShape="0">
+              <a:prstClr val="black">
+                <a:alpha val="40000"/>
+              </a:prstClr>
+            </a:outerShdw>
+          </a:effectLst>
+        </p:spPr>
+        <p:style>
+          <a:lnRef idx="2">
+            <a:schemeClr val="accent1">
+              <a:shade val="15000"/>
+            </a:schemeClr>
+          </a:lnRef>
+          <a:fillRef idx="1">
+            <a:schemeClr val="accent1"/>
+          </a:fillRef>
+          <a:effectRef idx="0">
+            <a:schemeClr val="accent1"/>
+          </a:effectRef>
+          <a:fontRef idx="minor">
+            <a:schemeClr val="lt1"/>
+          </a:fontRef>
+        </p:style>
+        <p:txBody>
+          <a:bodyPr rtlCol="0" anchor="ctr"/>
+          <a:lstStyle/>
+          <a:p>
+            <a:pPr algn="ctr"/>
+            <a:endParaRPr lang="en-US"/>
+          </a:p>
+        </p:txBody>
+      </p:sp>
+      <p:sp>
+        <p:nvSpPr>
+          <p:cNvPr id="28" name="Title Bar">
+            <a:extLst>
+              <a:ext uri="{FF2B5EF4-FFF2-40B4-BE49-F238E27FC236}">
+                <a16:creationId xmlns:a16="http://schemas.microsoft.com/office/drawing/2014/main" id="{DF52F5A7-FD76-D141-0BA2-536B5B2088BB}"/>
+              </a:ext>
+            </a:extLst>
+          </p:cNvPr>
+          <p:cNvSpPr/>
+          <p:nvPr/>
+        </p:nvSpPr>
+        <p:spPr>
+          <a:xfrm>
+            <a:off x="44814" y="89340"/>
+            <a:ext cx="10614778" cy="365760"/>
+          </a:xfrm>
+          <a:prstGeom prst="rect">
+            <a:avLst/>
+          </a:prstGeom>
+          <a:solidFill>
+            <a:schemeClr val="bg1"/>
+          </a:solidFill>
+          <a:ln>
+            <a:noFill/>
+          </a:ln>
+        </p:spPr>
+        <p:style>
+          <a:lnRef idx="2">
+            <a:schemeClr val="accent1">
+              <a:shade val="15000"/>
+            </a:schemeClr>
+          </a:lnRef>
+          <a:fillRef idx="1">
+            <a:schemeClr val="accent1"/>
+          </a:fillRef>
+          <a:effectRef idx="0">
+            <a:schemeClr val="accent1"/>
+          </a:effectRef>
+          <a:fontRef idx="minor">
+            <a:schemeClr val="lt1"/>
+          </a:fontRef>
+        </p:style>
+        <p:txBody>
+          <a:bodyPr rtlCol="0" anchor="ctr"/>
+          <a:lstStyle/>
+          <a:p>
+            <a:pPr algn="ctr"/>
+            <a:endParaRPr lang="en-US"/>
+          </a:p>
+        </p:txBody>
+      </p:sp>
+      <p:sp>
+        <p:nvSpPr>
+          <p:cNvPr id="29" name="Dashboard Title Left Accent">
+            <a:extLst>
+              <a:ext uri="{FF2B5EF4-FFF2-40B4-BE49-F238E27FC236}">
+                <a16:creationId xmlns:a16="http://schemas.microsoft.com/office/drawing/2014/main" id="{C9A546F3-70CF-FA10-5E2F-E92985A80D82}"/>
+              </a:ext>
+            </a:extLst>
+          </p:cNvPr>
+          <p:cNvSpPr/>
+          <p:nvPr/>
+        </p:nvSpPr>
+        <p:spPr>
+          <a:xfrm>
+            <a:off x="44814" y="89340"/>
+            <a:ext cx="135485" cy="365760"/>
+          </a:xfrm>
+          <a:prstGeom prst="rect">
+            <a:avLst/>
+          </a:prstGeom>
+          <a:solidFill>
+            <a:srgbClr val="00B0F0"/>
+          </a:solidFill>
+          <a:ln>
+            <a:noFill/>
+          </a:ln>
+        </p:spPr>
+        <p:style>
+          <a:lnRef idx="2">
+            <a:schemeClr val="accent1">
+              <a:shade val="15000"/>
+            </a:schemeClr>
+          </a:lnRef>
+          <a:fillRef idx="1">
+            <a:schemeClr val="accent1"/>
+          </a:fillRef>
+          <a:effectRef idx="0">
+            <a:schemeClr val="accent1"/>
+          </a:effectRef>
+          <a:fontRef idx="minor">
+            <a:schemeClr val="lt1"/>
+          </a:fontRef>
+        </p:style>
+        <p:txBody>
+          <a:bodyPr rtlCol="0" anchor="ctr"/>
+          <a:lstStyle/>
+          <a:p>
+            <a:pPr algn="ctr"/>
+            <a:endParaRPr lang="en-US"/>
+          </a:p>
+        </p:txBody>
+      </p:sp>
+      <p:sp>
+        <p:nvSpPr>
+          <p:cNvPr id="30" name="Dashboard Title Bar Right Accent">
+            <a:extLst>
+              <a:ext uri="{FF2B5EF4-FFF2-40B4-BE49-F238E27FC236}">
+                <a16:creationId xmlns:a16="http://schemas.microsoft.com/office/drawing/2014/main" id="{583456BB-E255-CD32-1B89-33C9864B5F33}"/>
+              </a:ext>
+            </a:extLst>
+          </p:cNvPr>
+          <p:cNvSpPr/>
+          <p:nvPr/>
+        </p:nvSpPr>
+        <p:spPr>
+          <a:xfrm>
+            <a:off x="10524106" y="89340"/>
+            <a:ext cx="135485" cy="365760"/>
+          </a:xfrm>
+          <a:prstGeom prst="rect">
+            <a:avLst/>
+          </a:prstGeom>
+          <a:solidFill>
+            <a:srgbClr val="E01A8B"/>
+          </a:solidFill>
+          <a:ln>
+            <a:noFill/>
+          </a:ln>
+        </p:spPr>
+        <p:style>
+          <a:lnRef idx="2">
+            <a:schemeClr val="accent1">
+              <a:shade val="15000"/>
+            </a:schemeClr>
+          </a:lnRef>
+          <a:fillRef idx="1">
+            <a:schemeClr val="accent1"/>
+          </a:fillRef>
+          <a:effectRef idx="0">
+            <a:schemeClr val="accent1"/>
+          </a:effectRef>
+          <a:fontRef idx="minor">
+            <a:schemeClr val="lt1"/>
+          </a:fontRef>
+        </p:style>
+        <p:txBody>
+          <a:bodyPr rtlCol="0" anchor="ctr"/>
+          <a:lstStyle/>
+          <a:p>
+            <a:pPr algn="ctr"/>
+            <a:endParaRPr lang="en-US"/>
+          </a:p>
+        </p:txBody>
+      </p:sp>
+      <p:sp>
+        <p:nvSpPr>
+          <p:cNvPr id="31" name="Navigation Panel Left Side">
+            <a:extLst>
+              <a:ext uri="{FF2B5EF4-FFF2-40B4-BE49-F238E27FC236}">
+                <a16:creationId xmlns:a16="http://schemas.microsoft.com/office/drawing/2014/main" id="{FF42E2FC-A9C7-CA34-5EA0-AB6F50F2B446}"/>
+              </a:ext>
+            </a:extLst>
+          </p:cNvPr>
+          <p:cNvSpPr/>
+          <p:nvPr/>
+        </p:nvSpPr>
+        <p:spPr>
+          <a:xfrm>
+            <a:off x="44814" y="559788"/>
+            <a:ext cx="1458166" cy="5297212"/>
+          </a:xfrm>
+          <a:prstGeom prst="roundRect">
+            <a:avLst>
+              <a:gd name="adj" fmla="val 8300"/>
+            </a:avLst>
+          </a:prstGeom>
+          <a:solidFill>
+            <a:schemeClr val="bg1"/>
+          </a:solidFill>
+          <a:ln>
+            <a:noFill/>
+          </a:ln>
+          <a:effectLst>
+            <a:outerShdw blurRad="50800" dist="38100" dir="10800000" algn="r" rotWithShape="0">
+              <a:prstClr val="black">
+                <a:alpha val="40000"/>
+              </a:prstClr>
+            </a:outerShdw>
+          </a:effectLst>
+        </p:spPr>
+        <p:style>
+          <a:lnRef idx="2">
+            <a:schemeClr val="accent1">
+              <a:shade val="15000"/>
+            </a:schemeClr>
+          </a:lnRef>
+          <a:fillRef idx="1">
+            <a:schemeClr val="accent1"/>
+          </a:fillRef>
+          <a:effectRef idx="0">
+            <a:schemeClr val="accent1"/>
+          </a:effectRef>
+          <a:fontRef idx="minor">
+            <a:schemeClr val="lt1"/>
+          </a:fontRef>
+        </p:style>
+        <p:txBody>
+          <a:bodyPr rtlCol="0" anchor="ctr"/>
+          <a:lstStyle/>
+          <a:p>
+            <a:pPr algn="ctr"/>
+            <a:endParaRPr lang="en-US"/>
+          </a:p>
+        </p:txBody>
+      </p:sp>
+      <p:sp>
+        <p:nvSpPr>
+          <p:cNvPr id="32" name="Navigation Panel Right Side">
+            <a:extLst>
+              <a:ext uri="{FF2B5EF4-FFF2-40B4-BE49-F238E27FC236}">
+                <a16:creationId xmlns:a16="http://schemas.microsoft.com/office/drawing/2014/main" id="{0499EFA2-8BA3-E5AA-AA89-FEB09FBA66CE}"/>
+              </a:ext>
+            </a:extLst>
+          </p:cNvPr>
+          <p:cNvSpPr/>
+          <p:nvPr/>
+        </p:nvSpPr>
+        <p:spPr>
+          <a:xfrm>
+            <a:off x="966952" y="559788"/>
+            <a:ext cx="572262" cy="5297212"/>
+          </a:xfrm>
+          <a:prstGeom prst="roundRect">
+            <a:avLst/>
+          </a:prstGeom>
+          <a:solidFill>
+            <a:schemeClr val="bg1"/>
+          </a:solidFill>
+          <a:ln>
+            <a:noFill/>
+          </a:ln>
+          <a:effectLst/>
+        </p:spPr>
+        <p:style>
+          <a:lnRef idx="2">
+            <a:schemeClr val="accent1">
+              <a:shade val="15000"/>
+            </a:schemeClr>
+          </a:lnRef>
+          <a:fillRef idx="1">
+            <a:schemeClr val="accent1"/>
+          </a:fillRef>
+          <a:effectRef idx="0">
+            <a:schemeClr val="accent1"/>
+          </a:effectRef>
+          <a:fontRef idx="minor">
+            <a:schemeClr val="lt1"/>
+          </a:fontRef>
+        </p:style>
+        <p:txBody>
+          <a:bodyPr rtlCol="0" anchor="ctr"/>
+          <a:lstStyle/>
+          <a:p>
+            <a:pPr algn="ctr"/>
+            <a:endParaRPr lang="en-US"/>
+          </a:p>
+        </p:txBody>
+      </p:sp>
+      <p:sp>
+        <p:nvSpPr>
+          <p:cNvPr id="2" name="Sub Category Card">
+            <a:extLst>
+              <a:ext uri="{FF2B5EF4-FFF2-40B4-BE49-F238E27FC236}">
+                <a16:creationId xmlns:a16="http://schemas.microsoft.com/office/drawing/2014/main" id="{5DD857F2-0BBC-4007-2509-B3035B1ADB09}"/>
+              </a:ext>
+            </a:extLst>
+          </p:cNvPr>
+          <p:cNvSpPr/>
+          <p:nvPr/>
+        </p:nvSpPr>
+        <p:spPr>
+          <a:xfrm>
+            <a:off x="6821214" y="1246255"/>
+            <a:ext cx="3838377" cy="4610745"/>
+          </a:xfrm>
+          <a:prstGeom prst="roundRect">
+            <a:avLst>
+              <a:gd name="adj" fmla="val 5115"/>
+            </a:avLst>
+          </a:prstGeom>
+          <a:solidFill>
+            <a:schemeClr val="bg1"/>
+          </a:solidFill>
+          <a:ln>
+            <a:noFill/>
+          </a:ln>
+          <a:effectLst/>
+        </p:spPr>
+        <p:style>
+          <a:lnRef idx="2">
+            <a:schemeClr val="accent1">
+              <a:shade val="15000"/>
+            </a:schemeClr>
+          </a:lnRef>
+          <a:fillRef idx="1">
+            <a:schemeClr val="accent1"/>
+          </a:fillRef>
+          <a:effectRef idx="0">
+            <a:schemeClr val="accent1"/>
+          </a:effectRef>
+          <a:fontRef idx="minor">
+            <a:schemeClr val="lt1"/>
+          </a:fontRef>
+        </p:style>
+        <p:txBody>
+          <a:bodyPr rtlCol="0" anchor="ctr"/>
+          <a:lstStyle/>
+          <a:p>
+            <a:pPr algn="ctr"/>
+            <a:endParaRPr lang="en-US"/>
+          </a:p>
+        </p:txBody>
+      </p:sp>
+      <p:sp>
+        <p:nvSpPr>
+          <p:cNvPr id="3" name="Industry Group Card">
+            <a:extLst>
+              <a:ext uri="{FF2B5EF4-FFF2-40B4-BE49-F238E27FC236}">
+                <a16:creationId xmlns:a16="http://schemas.microsoft.com/office/drawing/2014/main" id="{CC39EFDA-EAD5-8822-7AB2-5689E4DF52D1}"/>
+              </a:ext>
+            </a:extLst>
+          </p:cNvPr>
+          <p:cNvSpPr/>
+          <p:nvPr/>
+        </p:nvSpPr>
+        <p:spPr>
+          <a:xfrm>
+            <a:off x="1671144" y="1246255"/>
+            <a:ext cx="5029200" cy="2240280"/>
+          </a:xfrm>
+          <a:prstGeom prst="roundRect">
+            <a:avLst>
+              <a:gd name="adj" fmla="val 8723"/>
+            </a:avLst>
+          </a:prstGeom>
+          <a:solidFill>
+            <a:schemeClr val="bg1"/>
+          </a:solidFill>
+          <a:ln>
+            <a:noFill/>
+          </a:ln>
+        </p:spPr>
+        <p:style>
+          <a:lnRef idx="2">
+            <a:schemeClr val="accent1">
+              <a:shade val="15000"/>
+            </a:schemeClr>
+          </a:lnRef>
+          <a:fillRef idx="1">
+            <a:schemeClr val="accent1"/>
+          </a:fillRef>
+          <a:effectRef idx="0">
+            <a:schemeClr val="accent1"/>
+          </a:effectRef>
+          <a:fontRef idx="minor">
+            <a:schemeClr val="lt1"/>
+          </a:fontRef>
+        </p:style>
+        <p:txBody>
+          <a:bodyPr rtlCol="0" anchor="ctr"/>
+          <a:lstStyle/>
+          <a:p>
+            <a:pPr algn="ctr"/>
+            <a:endParaRPr lang="en-US"/>
+          </a:p>
+        </p:txBody>
+      </p:sp>
+      <p:sp>
+        <p:nvSpPr>
+          <p:cNvPr id="5" name="Industry Group Card">
+            <a:extLst>
+              <a:ext uri="{FF2B5EF4-FFF2-40B4-BE49-F238E27FC236}">
+                <a16:creationId xmlns:a16="http://schemas.microsoft.com/office/drawing/2014/main" id="{B1DF29EB-26D3-E2B6-DFE0-2AB8B622FEE6}"/>
+              </a:ext>
+            </a:extLst>
+          </p:cNvPr>
+          <p:cNvSpPr/>
+          <p:nvPr/>
+        </p:nvSpPr>
+        <p:spPr>
+          <a:xfrm>
+            <a:off x="1671144" y="3616720"/>
+            <a:ext cx="5029200" cy="2240280"/>
+          </a:xfrm>
+          <a:prstGeom prst="roundRect">
+            <a:avLst>
+              <a:gd name="adj" fmla="val 8723"/>
+            </a:avLst>
+          </a:prstGeom>
+          <a:solidFill>
+            <a:schemeClr val="bg1"/>
+          </a:solidFill>
+          <a:ln>
+            <a:noFill/>
+          </a:ln>
+        </p:spPr>
+        <p:style>
+          <a:lnRef idx="2">
+            <a:schemeClr val="accent1">
+              <a:shade val="15000"/>
+            </a:schemeClr>
+          </a:lnRef>
+          <a:fillRef idx="1">
+            <a:schemeClr val="accent1"/>
+          </a:fillRef>
+          <a:effectRef idx="0">
+            <a:schemeClr val="accent1"/>
+          </a:effectRef>
+          <a:fontRef idx="minor">
+            <a:schemeClr val="lt1"/>
+          </a:fontRef>
+        </p:style>
+        <p:txBody>
+          <a:bodyPr rtlCol="0" anchor="ctr"/>
+          <a:lstStyle/>
+          <a:p>
+            <a:pPr algn="ctr"/>
+            <a:endParaRPr lang="en-US"/>
+          </a:p>
+        </p:txBody>
+      </p:sp>
+    </p:spTree>
+    <p:extLst>
+      <p:ext uri="{BB962C8B-B14F-4D97-AF65-F5344CB8AC3E}">
+        <p14:creationId xmlns:p14="http://schemas.microsoft.com/office/powerpoint/2010/main" val="3211582888"/>
+      </p:ext>
+    </p:extLst>
+  </p:cSld>
+  <p:clrMapOvr>
+    <a:masterClrMapping/>
+  </p:clrMapOvr>
+</p:sld>
+</file>
+
+<file path=ppt/slides/slide4.xml><?xml version="1.0" encoding="utf-8"?>
+<p:sld xmlns:a="http://schemas.openxmlformats.org/drawingml/2006/main" xmlns:r="http://schemas.openxmlformats.org/officeDocument/2006/relationships" xmlns:p="http://schemas.openxmlformats.org/presentationml/2006/main">
+  <p:cSld>
+    <p:bg>
+      <p:bgPr>
+        <a:solidFill>
+          <a:schemeClr val="bg1">
+            <a:lumMod val="95000"/>
+          </a:schemeClr>
+        </a:solidFill>
+        <a:effectLst/>
+      </p:bgPr>
+    </p:bg>
+    <p:spTree>
+      <p:nvGrpSpPr>
+        <p:cNvPr id="1" name=""/>
+        <p:cNvGrpSpPr/>
+        <p:nvPr/>
+      </p:nvGrpSpPr>
+      <p:grpSpPr>
+        <a:xfrm>
+          <a:off x="0" y="0"/>
+          <a:ext cx="0" cy="0"/>
+          <a:chOff x="0" y="0"/>
+          <a:chExt cx="0" cy="0"/>
+        </a:xfrm>
+      </p:grpSpPr>
+      <p:sp>
+        <p:nvSpPr>
+          <p:cNvPr id="33" name="Slicer Panel Background">
+            <a:extLst>
+              <a:ext uri="{FF2B5EF4-FFF2-40B4-BE49-F238E27FC236}">
+                <a16:creationId xmlns:a16="http://schemas.microsoft.com/office/drawing/2014/main" id="{65536100-CA4D-75FB-4E79-36F3236061D4}"/>
+              </a:ext>
+            </a:extLst>
+          </p:cNvPr>
+          <p:cNvSpPr/>
+          <p:nvPr/>
+        </p:nvSpPr>
+        <p:spPr>
+          <a:xfrm>
+            <a:off x="1036891" y="559789"/>
+            <a:ext cx="9622700" cy="538817"/>
+          </a:xfrm>
+          <a:prstGeom prst="roundRect">
+            <a:avLst/>
+          </a:prstGeom>
+          <a:solidFill>
+            <a:schemeClr val="bg1"/>
+          </a:solidFill>
+          <a:ln>
+            <a:noFill/>
+          </a:ln>
+          <a:effectLst>
+            <a:outerShdw blurRad="50800" dist="38100" dir="5400000" algn="t" rotWithShape="0">
+              <a:prstClr val="black">
+                <a:alpha val="40000"/>
+              </a:prstClr>
+            </a:outerShdw>
+          </a:effectLst>
+        </p:spPr>
+        <p:style>
+          <a:lnRef idx="2">
+            <a:schemeClr val="accent1">
+              <a:shade val="15000"/>
+            </a:schemeClr>
+          </a:lnRef>
+          <a:fillRef idx="1">
+            <a:schemeClr val="accent1"/>
+          </a:fillRef>
+          <a:effectRef idx="0">
+            <a:schemeClr val="accent1"/>
+          </a:effectRef>
+          <a:fontRef idx="minor">
+            <a:schemeClr val="lt1"/>
+          </a:fontRef>
+        </p:style>
+        <p:txBody>
+          <a:bodyPr rtlCol="0" anchor="ctr"/>
+          <a:lstStyle/>
+          <a:p>
+            <a:pPr algn="ctr"/>
+            <a:endParaRPr lang="en-US"/>
+          </a:p>
+        </p:txBody>
+      </p:sp>
+      <p:sp>
+        <p:nvSpPr>
+          <p:cNvPr id="28" name="Title Bar">
+            <a:extLst>
+              <a:ext uri="{FF2B5EF4-FFF2-40B4-BE49-F238E27FC236}">
+                <a16:creationId xmlns:a16="http://schemas.microsoft.com/office/drawing/2014/main" id="{DF52F5A7-FD76-D141-0BA2-536B5B2088BB}"/>
+              </a:ext>
+            </a:extLst>
+          </p:cNvPr>
+          <p:cNvSpPr/>
+          <p:nvPr/>
+        </p:nvSpPr>
+        <p:spPr>
+          <a:xfrm>
+            <a:off x="44814" y="89340"/>
+            <a:ext cx="10614778" cy="365760"/>
+          </a:xfrm>
+          <a:prstGeom prst="rect">
+            <a:avLst/>
+          </a:prstGeom>
+          <a:solidFill>
+            <a:schemeClr val="bg1"/>
+          </a:solidFill>
+          <a:ln>
+            <a:noFill/>
+          </a:ln>
+        </p:spPr>
+        <p:style>
+          <a:lnRef idx="2">
+            <a:schemeClr val="accent1">
+              <a:shade val="15000"/>
+            </a:schemeClr>
+          </a:lnRef>
+          <a:fillRef idx="1">
+            <a:schemeClr val="accent1"/>
+          </a:fillRef>
+          <a:effectRef idx="0">
+            <a:schemeClr val="accent1"/>
+          </a:effectRef>
+          <a:fontRef idx="minor">
+            <a:schemeClr val="lt1"/>
+          </a:fontRef>
+        </p:style>
+        <p:txBody>
+          <a:bodyPr rtlCol="0" anchor="ctr"/>
+          <a:lstStyle/>
+          <a:p>
+            <a:pPr algn="ctr"/>
+            <a:endParaRPr lang="en-US"/>
+          </a:p>
+        </p:txBody>
+      </p:sp>
+      <p:sp>
+        <p:nvSpPr>
+          <p:cNvPr id="29" name="Dashboard Title Left Accent">
+            <a:extLst>
+              <a:ext uri="{FF2B5EF4-FFF2-40B4-BE49-F238E27FC236}">
+                <a16:creationId xmlns:a16="http://schemas.microsoft.com/office/drawing/2014/main" id="{C9A546F3-70CF-FA10-5E2F-E92985A80D82}"/>
+              </a:ext>
+            </a:extLst>
+          </p:cNvPr>
+          <p:cNvSpPr/>
+          <p:nvPr/>
+        </p:nvSpPr>
+        <p:spPr>
+          <a:xfrm>
+            <a:off x="44814" y="89340"/>
+            <a:ext cx="135485" cy="365760"/>
+          </a:xfrm>
+          <a:prstGeom prst="rect">
+            <a:avLst/>
+          </a:prstGeom>
+          <a:solidFill>
+            <a:srgbClr val="00B0F0"/>
+          </a:solidFill>
+          <a:ln>
+            <a:noFill/>
+          </a:ln>
+        </p:spPr>
+        <p:style>
+          <a:lnRef idx="2">
+            <a:schemeClr val="accent1">
+              <a:shade val="15000"/>
+            </a:schemeClr>
+          </a:lnRef>
+          <a:fillRef idx="1">
+            <a:schemeClr val="accent1"/>
+          </a:fillRef>
+          <a:effectRef idx="0">
+            <a:schemeClr val="accent1"/>
+          </a:effectRef>
+          <a:fontRef idx="minor">
+            <a:schemeClr val="lt1"/>
+          </a:fontRef>
+        </p:style>
+        <p:txBody>
+          <a:bodyPr rtlCol="0" anchor="ctr"/>
+          <a:lstStyle/>
+          <a:p>
+            <a:pPr algn="ctr"/>
+            <a:endParaRPr lang="en-US"/>
+          </a:p>
+        </p:txBody>
+      </p:sp>
+      <p:sp>
+        <p:nvSpPr>
+          <p:cNvPr id="30" name="Dashboard Title Bar Right Accent">
+            <a:extLst>
+              <a:ext uri="{FF2B5EF4-FFF2-40B4-BE49-F238E27FC236}">
+                <a16:creationId xmlns:a16="http://schemas.microsoft.com/office/drawing/2014/main" id="{583456BB-E255-CD32-1B89-33C9864B5F33}"/>
+              </a:ext>
+            </a:extLst>
+          </p:cNvPr>
+          <p:cNvSpPr/>
+          <p:nvPr/>
+        </p:nvSpPr>
+        <p:spPr>
+          <a:xfrm>
+            <a:off x="10524106" y="89340"/>
+            <a:ext cx="135485" cy="365760"/>
+          </a:xfrm>
+          <a:prstGeom prst="rect">
+            <a:avLst/>
+          </a:prstGeom>
+          <a:solidFill>
+            <a:srgbClr val="E01A8B"/>
+          </a:solidFill>
+          <a:ln>
+            <a:noFill/>
+          </a:ln>
+        </p:spPr>
+        <p:style>
+          <a:lnRef idx="2">
+            <a:schemeClr val="accent1">
+              <a:shade val="15000"/>
+            </a:schemeClr>
+          </a:lnRef>
+          <a:fillRef idx="1">
+            <a:schemeClr val="accent1"/>
+          </a:fillRef>
+          <a:effectRef idx="0">
+            <a:schemeClr val="accent1"/>
+          </a:effectRef>
+          <a:fontRef idx="minor">
+            <a:schemeClr val="lt1"/>
+          </a:fontRef>
+        </p:style>
+        <p:txBody>
+          <a:bodyPr rtlCol="0" anchor="ctr"/>
+          <a:lstStyle/>
+          <a:p>
+            <a:pPr algn="ctr"/>
+            <a:endParaRPr lang="en-US"/>
+          </a:p>
+        </p:txBody>
+      </p:sp>
+      <p:sp>
+        <p:nvSpPr>
+          <p:cNvPr id="31" name="Navigation Panel Left Side">
+            <a:extLst>
+              <a:ext uri="{FF2B5EF4-FFF2-40B4-BE49-F238E27FC236}">
+                <a16:creationId xmlns:a16="http://schemas.microsoft.com/office/drawing/2014/main" id="{FF42E2FC-A9C7-CA34-5EA0-AB6F50F2B446}"/>
+              </a:ext>
+            </a:extLst>
+          </p:cNvPr>
+          <p:cNvSpPr/>
+          <p:nvPr/>
+        </p:nvSpPr>
+        <p:spPr>
+          <a:xfrm>
+            <a:off x="44814" y="559788"/>
+            <a:ext cx="1458166" cy="5297212"/>
+          </a:xfrm>
+          <a:prstGeom prst="roundRect">
+            <a:avLst>
+              <a:gd name="adj" fmla="val 8300"/>
+            </a:avLst>
+          </a:prstGeom>
+          <a:solidFill>
+            <a:schemeClr val="bg1"/>
+          </a:solidFill>
+          <a:ln>
+            <a:noFill/>
+          </a:ln>
+          <a:effectLst>
+            <a:outerShdw blurRad="50800" dist="38100" dir="10800000" algn="r" rotWithShape="0">
+              <a:prstClr val="black">
+                <a:alpha val="40000"/>
+              </a:prstClr>
+            </a:outerShdw>
+          </a:effectLst>
+        </p:spPr>
+        <p:style>
+          <a:lnRef idx="2">
+            <a:schemeClr val="accent1">
+              <a:shade val="15000"/>
+            </a:schemeClr>
+          </a:lnRef>
+          <a:fillRef idx="1">
+            <a:schemeClr val="accent1"/>
+          </a:fillRef>
+          <a:effectRef idx="0">
+            <a:schemeClr val="accent1"/>
+          </a:effectRef>
+          <a:fontRef idx="minor">
+            <a:schemeClr val="lt1"/>
+          </a:fontRef>
+        </p:style>
+        <p:txBody>
+          <a:bodyPr rtlCol="0" anchor="ctr"/>
+          <a:lstStyle/>
+          <a:p>
+            <a:pPr algn="ctr"/>
+            <a:endParaRPr lang="en-US"/>
+          </a:p>
+        </p:txBody>
+      </p:sp>
+      <p:sp>
+        <p:nvSpPr>
+          <p:cNvPr id="32" name="Navigation Panel Right Side">
+            <a:extLst>
+              <a:ext uri="{FF2B5EF4-FFF2-40B4-BE49-F238E27FC236}">
+                <a16:creationId xmlns:a16="http://schemas.microsoft.com/office/drawing/2014/main" id="{0499EFA2-8BA3-E5AA-AA89-FEB09FBA66CE}"/>
+              </a:ext>
+            </a:extLst>
+          </p:cNvPr>
+          <p:cNvSpPr/>
+          <p:nvPr/>
+        </p:nvSpPr>
+        <p:spPr>
+          <a:xfrm>
+            <a:off x="966952" y="559788"/>
+            <a:ext cx="572262" cy="5297212"/>
+          </a:xfrm>
+          <a:prstGeom prst="roundRect">
+            <a:avLst/>
+          </a:prstGeom>
+          <a:solidFill>
+            <a:schemeClr val="bg1"/>
+          </a:solidFill>
+          <a:ln>
+            <a:noFill/>
+          </a:ln>
+          <a:effectLst/>
+        </p:spPr>
+        <p:style>
+          <a:lnRef idx="2">
+            <a:schemeClr val="accent1">
+              <a:shade val="15000"/>
+            </a:schemeClr>
+          </a:lnRef>
+          <a:fillRef idx="1">
+            <a:schemeClr val="accent1"/>
+          </a:fillRef>
+          <a:effectRef idx="0">
+            <a:schemeClr val="accent1"/>
+          </a:effectRef>
+          <a:fontRef idx="minor">
+            <a:schemeClr val="lt1"/>
+          </a:fontRef>
+        </p:style>
+        <p:txBody>
+          <a:bodyPr rtlCol="0" anchor="ctr"/>
+          <a:lstStyle/>
+          <a:p>
+            <a:pPr algn="ctr"/>
+            <a:endParaRPr lang="en-US"/>
+          </a:p>
+        </p:txBody>
+      </p:sp>
+      <p:sp>
+        <p:nvSpPr>
+          <p:cNvPr id="36" name="Address Card">
+            <a:extLst>
+              <a:ext uri="{FF2B5EF4-FFF2-40B4-BE49-F238E27FC236}">
+                <a16:creationId xmlns:a16="http://schemas.microsoft.com/office/drawing/2014/main" id="{125F922C-7925-92FC-8D9D-9FBCD1E762F4}"/>
+              </a:ext>
+            </a:extLst>
+          </p:cNvPr>
+          <p:cNvSpPr/>
+          <p:nvPr/>
+        </p:nvSpPr>
+        <p:spPr>
+          <a:xfrm>
+            <a:off x="1671143" y="1246255"/>
+            <a:ext cx="8988447" cy="4610745"/>
+          </a:xfrm>
+          <a:prstGeom prst="roundRect">
+            <a:avLst>
+              <a:gd name="adj" fmla="val 4164"/>
+            </a:avLst>
+          </a:prstGeom>
+          <a:solidFill>
+            <a:schemeClr val="bg1"/>
+          </a:solidFill>
+          <a:ln>
+            <a:noFill/>
+          </a:ln>
+        </p:spPr>
+        <p:style>
+          <a:lnRef idx="2">
+            <a:schemeClr val="accent1">
+              <a:shade val="15000"/>
+            </a:schemeClr>
+          </a:lnRef>
+          <a:fillRef idx="1">
+            <a:schemeClr val="accent1"/>
+          </a:fillRef>
+          <a:effectRef idx="0">
+            <a:schemeClr val="accent1"/>
+          </a:effectRef>
+          <a:fontRef idx="minor">
+            <a:schemeClr val="lt1"/>
+          </a:fontRef>
+        </p:style>
+        <p:txBody>
+          <a:bodyPr rtlCol="0" anchor="ctr"/>
+          <a:lstStyle/>
+          <a:p>
+            <a:pPr algn="ctr"/>
+            <a:endParaRPr lang="en-US"/>
+          </a:p>
+        </p:txBody>
+      </p:sp>
+    </p:spTree>
+    <p:extLst>
+      <p:ext uri="{BB962C8B-B14F-4D97-AF65-F5344CB8AC3E}">
+        <p14:creationId xmlns:p14="http://schemas.microsoft.com/office/powerpoint/2010/main" val="3995899697"/>
       </p:ext>
     </p:extLst>
   </p:cSld>

</xml_diff>

<commit_message>
Completed, Initial Release Version!
</commit_message>
<xml_diff>
--- a/Background/Backgrounds for Report.pptx
+++ b/Background/Backgrounds for Report.pptx
@@ -9,6 +9,7 @@
     <p:sldId id="257" r:id="rId3"/>
     <p:sldId id="258" r:id="rId4"/>
     <p:sldId id="259" r:id="rId5"/>
+    <p:sldId id="260" r:id="rId6"/>
   </p:sldIdLst>
   <p:sldSz cx="10729913" cy="6035675"/>
   <p:notesSz cx="6858000" cy="9144000"/>
@@ -118,7 +119,7 @@
 <file path=ppt/revisionInfo.xml><?xml version="1.0" encoding="utf-8"?>
 <p1510:revInfo xmlns:a="http://schemas.openxmlformats.org/drawingml/2006/main" xmlns:r="http://schemas.openxmlformats.org/officeDocument/2006/relationships" xmlns:p1510="http://schemas.microsoft.com/office/powerpoint/2015/10/main">
   <p1510:revLst>
-    <p1510:client id="{BD549498-3C09-4EB4-B4FE-2C5D88A772BF}" v="36" dt="2023-08-02T09:32:55.379"/>
+    <p1510:client id="{BD549498-3C09-4EB4-B4FE-2C5D88A772BF}" v="53" dt="2023-08-04T03:16:34.291"/>
   </p1510:revLst>
 </p1510:revInfo>
 </file>
@@ -128,7 +129,7 @@
   <pc:docChgLst>
     <pc:chgData name="Andrew Hubbard" userId="efcfa07183130be2" providerId="LiveId" clId="{BD549498-3C09-4EB4-B4FE-2C5D88A772BF}"/>
     <pc:docChg chg="undo custSel addSld modSld sldOrd">
-      <pc:chgData name="Andrew Hubbard" userId="efcfa07183130be2" providerId="LiveId" clId="{BD549498-3C09-4EB4-B4FE-2C5D88A772BF}" dt="2023-08-02T09:33:10.518" v="321" actId="555"/>
+      <pc:chgData name="Andrew Hubbard" userId="efcfa07183130be2" providerId="LiveId" clId="{BD549498-3C09-4EB4-B4FE-2C5D88A772BF}" dt="2023-08-04T03:17:19.223" v="452" actId="555"/>
       <pc:docMkLst>
         <pc:docMk/>
       </pc:docMkLst>
@@ -416,6 +417,165 @@
           </ac:spMkLst>
         </pc:spChg>
       </pc:sldChg>
+      <pc:sldChg chg="addSp delSp modSp add mod">
+        <pc:chgData name="Andrew Hubbard" userId="efcfa07183130be2" providerId="LiveId" clId="{BD549498-3C09-4EB4-B4FE-2C5D88A772BF}" dt="2023-08-04T03:17:19.223" v="452" actId="555"/>
+        <pc:sldMkLst>
+          <pc:docMk/>
+          <pc:sldMk cId="58485854" sldId="260"/>
+        </pc:sldMkLst>
+        <pc:spChg chg="add mod">
+          <ac:chgData name="Andrew Hubbard" userId="efcfa07183130be2" providerId="LiveId" clId="{BD549498-3C09-4EB4-B4FE-2C5D88A772BF}" dt="2023-08-03T05:05:12.842" v="419" actId="14100"/>
+          <ac:spMkLst>
+            <pc:docMk/>
+            <pc:sldMk cId="58485854" sldId="260"/>
+            <ac:spMk id="2" creationId="{9AEC1336-5D1D-A787-B94A-C5EA527E8DE5}"/>
+          </ac:spMkLst>
+        </pc:spChg>
+        <pc:spChg chg="add mod">
+          <ac:chgData name="Andrew Hubbard" userId="efcfa07183130be2" providerId="LiveId" clId="{BD549498-3C09-4EB4-B4FE-2C5D88A772BF}" dt="2023-08-04T03:17:19.223" v="452" actId="555"/>
+          <ac:spMkLst>
+            <pc:docMk/>
+            <pc:sldMk cId="58485854" sldId="260"/>
+            <ac:spMk id="3" creationId="{D3417DCE-D727-9D17-ADD2-86D5973B6065}"/>
+          </ac:spMkLst>
+        </pc:spChg>
+        <pc:spChg chg="add del mod">
+          <ac:chgData name="Andrew Hubbard" userId="efcfa07183130be2" providerId="LiveId" clId="{BD549498-3C09-4EB4-B4FE-2C5D88A772BF}" dt="2023-08-03T01:30:27.170" v="342" actId="478"/>
+          <ac:spMkLst>
+            <pc:docMk/>
+            <pc:sldMk cId="58485854" sldId="260"/>
+            <ac:spMk id="4" creationId="{396B9CCF-6EDC-6AC0-1293-8A5808512C00}"/>
+          </ac:spMkLst>
+        </pc:spChg>
+        <pc:spChg chg="add del mod">
+          <ac:chgData name="Andrew Hubbard" userId="efcfa07183130be2" providerId="LiveId" clId="{BD549498-3C09-4EB4-B4FE-2C5D88A772BF}" dt="2023-08-03T01:30:27.841" v="343" actId="478"/>
+          <ac:spMkLst>
+            <pc:docMk/>
+            <pc:sldMk cId="58485854" sldId="260"/>
+            <ac:spMk id="5" creationId="{2F64DF3A-BF54-0FC3-0789-B75AF8F00C4B}"/>
+          </ac:spMkLst>
+        </pc:spChg>
+        <pc:spChg chg="add del mod">
+          <ac:chgData name="Andrew Hubbard" userId="efcfa07183130be2" providerId="LiveId" clId="{BD549498-3C09-4EB4-B4FE-2C5D88A772BF}" dt="2023-08-03T01:30:28.656" v="344" actId="478"/>
+          <ac:spMkLst>
+            <pc:docMk/>
+            <pc:sldMk cId="58485854" sldId="260"/>
+            <ac:spMk id="6" creationId="{A8BA92B8-FD5B-DD21-4236-A9C64669F688}"/>
+          </ac:spMkLst>
+        </pc:spChg>
+        <pc:spChg chg="add del mod">
+          <ac:chgData name="Andrew Hubbard" userId="efcfa07183130be2" providerId="LiveId" clId="{BD549498-3C09-4EB4-B4FE-2C5D88A772BF}" dt="2023-08-03T01:31:19.338" v="357" actId="478"/>
+          <ac:spMkLst>
+            <pc:docMk/>
+            <pc:sldMk cId="58485854" sldId="260"/>
+            <ac:spMk id="7" creationId="{79C6CCFE-E496-FA54-7807-380DEA32302D}"/>
+          </ac:spMkLst>
+        </pc:spChg>
+        <pc:spChg chg="add del mod">
+          <ac:chgData name="Andrew Hubbard" userId="efcfa07183130be2" providerId="LiveId" clId="{BD549498-3C09-4EB4-B4FE-2C5D88A772BF}" dt="2023-08-03T01:31:20.111" v="358" actId="478"/>
+          <ac:spMkLst>
+            <pc:docMk/>
+            <pc:sldMk cId="58485854" sldId="260"/>
+            <ac:spMk id="8" creationId="{64D60E6F-64A5-3106-05FA-E5E48114EA5A}"/>
+          </ac:spMkLst>
+        </pc:spChg>
+        <pc:spChg chg="add del mod">
+          <ac:chgData name="Andrew Hubbard" userId="efcfa07183130be2" providerId="LiveId" clId="{BD549498-3C09-4EB4-B4FE-2C5D88A772BF}" dt="2023-08-03T01:31:20.731" v="359" actId="478"/>
+          <ac:spMkLst>
+            <pc:docMk/>
+            <pc:sldMk cId="58485854" sldId="260"/>
+            <ac:spMk id="9" creationId="{5A1B9CC2-7A6A-EF29-0FCD-0C1B370BCAFD}"/>
+          </ac:spMkLst>
+        </pc:spChg>
+        <pc:spChg chg="add del mod">
+          <ac:chgData name="Andrew Hubbard" userId="efcfa07183130be2" providerId="LiveId" clId="{BD549498-3C09-4EB4-B4FE-2C5D88A772BF}" dt="2023-08-03T01:31:21.399" v="360" actId="478"/>
+          <ac:spMkLst>
+            <pc:docMk/>
+            <pc:sldMk cId="58485854" sldId="260"/>
+            <ac:spMk id="10" creationId="{98640079-AECB-A8D4-D231-DD07697A650E}"/>
+          </ac:spMkLst>
+        </pc:spChg>
+        <pc:spChg chg="add del mod">
+          <ac:chgData name="Andrew Hubbard" userId="efcfa07183130be2" providerId="LiveId" clId="{BD549498-3C09-4EB4-B4FE-2C5D88A772BF}" dt="2023-08-03T01:32:08.196" v="373" actId="478"/>
+          <ac:spMkLst>
+            <pc:docMk/>
+            <pc:sldMk cId="58485854" sldId="260"/>
+            <ac:spMk id="11" creationId="{14F4CB5D-059E-F129-715A-218CB20D436F}"/>
+          </ac:spMkLst>
+        </pc:spChg>
+        <pc:spChg chg="add del mod">
+          <ac:chgData name="Andrew Hubbard" userId="efcfa07183130be2" providerId="LiveId" clId="{BD549498-3C09-4EB4-B4FE-2C5D88A772BF}" dt="2023-08-04T03:16:13.685" v="433" actId="478"/>
+          <ac:spMkLst>
+            <pc:docMk/>
+            <pc:sldMk cId="58485854" sldId="260"/>
+            <ac:spMk id="12" creationId="{D5271E4D-221E-5929-3976-9FD4CA2E523C}"/>
+          </ac:spMkLst>
+        </pc:spChg>
+        <pc:spChg chg="add del mod">
+          <ac:chgData name="Andrew Hubbard" userId="efcfa07183130be2" providerId="LiveId" clId="{BD549498-3C09-4EB4-B4FE-2C5D88A772BF}" dt="2023-08-04T03:16:14.400" v="434" actId="478"/>
+          <ac:spMkLst>
+            <pc:docMk/>
+            <pc:sldMk cId="58485854" sldId="260"/>
+            <ac:spMk id="13" creationId="{532FEE9E-52FB-BE07-2982-6AC6B55B2EF1}"/>
+          </ac:spMkLst>
+        </pc:spChg>
+        <pc:spChg chg="add del mod">
+          <ac:chgData name="Andrew Hubbard" userId="efcfa07183130be2" providerId="LiveId" clId="{BD549498-3C09-4EB4-B4FE-2C5D88A772BF}" dt="2023-08-04T03:16:15.043" v="435" actId="478"/>
+          <ac:spMkLst>
+            <pc:docMk/>
+            <pc:sldMk cId="58485854" sldId="260"/>
+            <ac:spMk id="14" creationId="{EC9EAAB0-6B25-B852-563A-3C375361547E}"/>
+          </ac:spMkLst>
+        </pc:spChg>
+        <pc:spChg chg="add del mod">
+          <ac:chgData name="Andrew Hubbard" userId="efcfa07183130be2" providerId="LiveId" clId="{BD549498-3C09-4EB4-B4FE-2C5D88A772BF}" dt="2023-08-04T03:16:15.671" v="436" actId="478"/>
+          <ac:spMkLst>
+            <pc:docMk/>
+            <pc:sldMk cId="58485854" sldId="260"/>
+            <ac:spMk id="15" creationId="{717E7997-8711-9DD0-6B19-84FDF2CF7A68}"/>
+          </ac:spMkLst>
+        </pc:spChg>
+        <pc:spChg chg="add del mod">
+          <ac:chgData name="Andrew Hubbard" userId="efcfa07183130be2" providerId="LiveId" clId="{BD549498-3C09-4EB4-B4FE-2C5D88A772BF}" dt="2023-08-04T03:16:16.493" v="437" actId="478"/>
+          <ac:spMkLst>
+            <pc:docMk/>
+            <pc:sldMk cId="58485854" sldId="260"/>
+            <ac:spMk id="16" creationId="{55B08E20-B43E-7403-55A1-8E1590488699}"/>
+          </ac:spMkLst>
+        </pc:spChg>
+        <pc:spChg chg="add del mod">
+          <ac:chgData name="Andrew Hubbard" userId="efcfa07183130be2" providerId="LiveId" clId="{BD549498-3C09-4EB4-B4FE-2C5D88A772BF}" dt="2023-08-03T04:20:14.211" v="383"/>
+          <ac:spMkLst>
+            <pc:docMk/>
+            <pc:sldMk cId="58485854" sldId="260"/>
+            <ac:spMk id="17" creationId="{AC9F5966-460D-38D6-5D60-7DB655E64141}"/>
+          </ac:spMkLst>
+        </pc:spChg>
+        <pc:spChg chg="mod">
+          <ac:chgData name="Andrew Hubbard" userId="efcfa07183130be2" providerId="LiveId" clId="{BD549498-3C09-4EB4-B4FE-2C5D88A772BF}" dt="2023-08-04T03:17:19.223" v="452" actId="555"/>
+          <ac:spMkLst>
+            <pc:docMk/>
+            <pc:sldMk cId="58485854" sldId="260"/>
+            <ac:spMk id="31" creationId="{FF42E2FC-A9C7-CA34-5EA0-AB6F50F2B446}"/>
+          </ac:spMkLst>
+        </pc:spChg>
+        <pc:spChg chg="mod">
+          <ac:chgData name="Andrew Hubbard" userId="efcfa07183130be2" providerId="LiveId" clId="{BD549498-3C09-4EB4-B4FE-2C5D88A772BF}" dt="2023-08-04T03:17:10.410" v="450" actId="14100"/>
+          <ac:spMkLst>
+            <pc:docMk/>
+            <pc:sldMk cId="58485854" sldId="260"/>
+            <ac:spMk id="36" creationId="{125F922C-7925-92FC-8D9D-9FBCD1E762F4}"/>
+          </ac:spMkLst>
+        </pc:spChg>
+        <pc:picChg chg="add del mod">
+          <ac:chgData name="Andrew Hubbard" userId="efcfa07183130be2" providerId="LiveId" clId="{BD549498-3C09-4EB4-B4FE-2C5D88A772BF}" dt="2023-08-03T01:27:58.670" v="330" actId="478"/>
+          <ac:picMkLst>
+            <pc:docMk/>
+            <pc:sldMk cId="58485854" sldId="260"/>
+            <ac:picMk id="3" creationId="{35E481C6-31D6-571E-8852-20619A632207}"/>
+          </ac:picMkLst>
+        </pc:picChg>
+      </pc:sldChg>
     </pc:docChg>
   </pc:docChgLst>
 </pc:chgInfo>
@@ -552,7 +712,7 @@
           <a:p>
             <a:fld id="{BC16F218-39A0-41C7-9739-6124B1EB9EBC}" type="datetimeFigureOut">
               <a:rPr lang="en-US" smtClean="0"/>
-              <a:t>8/2/2023</a:t>
+              <a:t>8/4/2023</a:t>
             </a:fld>
             <a:endParaRPr lang="en-US"/>
           </a:p>
@@ -722,7 +882,7 @@
           <a:p>
             <a:fld id="{BC16F218-39A0-41C7-9739-6124B1EB9EBC}" type="datetimeFigureOut">
               <a:rPr lang="en-US" smtClean="0"/>
-              <a:t>8/2/2023</a:t>
+              <a:t>8/4/2023</a:t>
             </a:fld>
             <a:endParaRPr lang="en-US"/>
           </a:p>
@@ -902,7 +1062,7 @@
           <a:p>
             <a:fld id="{BC16F218-39A0-41C7-9739-6124B1EB9EBC}" type="datetimeFigureOut">
               <a:rPr lang="en-US" smtClean="0"/>
-              <a:t>8/2/2023</a:t>
+              <a:t>8/4/2023</a:t>
             </a:fld>
             <a:endParaRPr lang="en-US"/>
           </a:p>
@@ -1072,7 +1232,7 @@
           <a:p>
             <a:fld id="{BC16F218-39A0-41C7-9739-6124B1EB9EBC}" type="datetimeFigureOut">
               <a:rPr lang="en-US" smtClean="0"/>
-              <a:t>8/2/2023</a:t>
+              <a:t>8/4/2023</a:t>
             </a:fld>
             <a:endParaRPr lang="en-US"/>
           </a:p>
@@ -1318,7 +1478,7 @@
           <a:p>
             <a:fld id="{BC16F218-39A0-41C7-9739-6124B1EB9EBC}" type="datetimeFigureOut">
               <a:rPr lang="en-US" smtClean="0"/>
-              <a:t>8/2/2023</a:t>
+              <a:t>8/4/2023</a:t>
             </a:fld>
             <a:endParaRPr lang="en-US"/>
           </a:p>
@@ -1550,7 +1710,7 @@
           <a:p>
             <a:fld id="{BC16F218-39A0-41C7-9739-6124B1EB9EBC}" type="datetimeFigureOut">
               <a:rPr lang="en-US" smtClean="0"/>
-              <a:t>8/2/2023</a:t>
+              <a:t>8/4/2023</a:t>
             </a:fld>
             <a:endParaRPr lang="en-US"/>
           </a:p>
@@ -1917,7 +2077,7 @@
           <a:p>
             <a:fld id="{BC16F218-39A0-41C7-9739-6124B1EB9EBC}" type="datetimeFigureOut">
               <a:rPr lang="en-US" smtClean="0"/>
-              <a:t>8/2/2023</a:t>
+              <a:t>8/4/2023</a:t>
             </a:fld>
             <a:endParaRPr lang="en-US"/>
           </a:p>
@@ -2035,7 +2195,7 @@
           <a:p>
             <a:fld id="{BC16F218-39A0-41C7-9739-6124B1EB9EBC}" type="datetimeFigureOut">
               <a:rPr lang="en-US" smtClean="0"/>
-              <a:t>8/2/2023</a:t>
+              <a:t>8/4/2023</a:t>
             </a:fld>
             <a:endParaRPr lang="en-US"/>
           </a:p>
@@ -2130,7 +2290,7 @@
           <a:p>
             <a:fld id="{BC16F218-39A0-41C7-9739-6124B1EB9EBC}" type="datetimeFigureOut">
               <a:rPr lang="en-US" smtClean="0"/>
-              <a:t>8/2/2023</a:t>
+              <a:t>8/4/2023</a:t>
             </a:fld>
             <a:endParaRPr lang="en-US"/>
           </a:p>
@@ -2407,7 +2567,7 @@
           <a:p>
             <a:fld id="{BC16F218-39A0-41C7-9739-6124B1EB9EBC}" type="datetimeFigureOut">
               <a:rPr lang="en-US" smtClean="0"/>
-              <a:t>8/2/2023</a:t>
+              <a:t>8/4/2023</a:t>
             </a:fld>
             <a:endParaRPr lang="en-US"/>
           </a:p>
@@ -2664,7 +2824,7 @@
           <a:p>
             <a:fld id="{BC16F218-39A0-41C7-9739-6124B1EB9EBC}" type="datetimeFigureOut">
               <a:rPr lang="en-US" smtClean="0"/>
-              <a:t>8/2/2023</a:t>
+              <a:t>8/4/2023</a:t>
             </a:fld>
             <a:endParaRPr lang="en-US"/>
           </a:p>
@@ -2877,7 +3037,7 @@
           <a:p>
             <a:fld id="{BC16F218-39A0-41C7-9739-6124B1EB9EBC}" type="datetimeFigureOut">
               <a:rPr lang="en-US" smtClean="0"/>
-              <a:t>8/2/2023</a:t>
+              <a:t>8/4/2023</a:t>
             </a:fld>
             <a:endParaRPr lang="en-US"/>
           </a:p>
@@ -5563,6 +5723,537 @@
     <p:extLst>
       <p:ext uri="{BB962C8B-B14F-4D97-AF65-F5344CB8AC3E}">
         <p14:creationId xmlns:p14="http://schemas.microsoft.com/office/powerpoint/2010/main" val="3995899697"/>
+      </p:ext>
+    </p:extLst>
+  </p:cSld>
+  <p:clrMapOvr>
+    <a:masterClrMapping/>
+  </p:clrMapOvr>
+</p:sld>
+</file>
+
+<file path=ppt/slides/slide5.xml><?xml version="1.0" encoding="utf-8"?>
+<p:sld xmlns:a="http://schemas.openxmlformats.org/drawingml/2006/main" xmlns:r="http://schemas.openxmlformats.org/officeDocument/2006/relationships" xmlns:p="http://schemas.openxmlformats.org/presentationml/2006/main">
+  <p:cSld>
+    <p:bg>
+      <p:bgPr>
+        <a:solidFill>
+          <a:schemeClr val="bg1">
+            <a:lumMod val="95000"/>
+          </a:schemeClr>
+        </a:solidFill>
+        <a:effectLst/>
+      </p:bgPr>
+    </p:bg>
+    <p:spTree>
+      <p:nvGrpSpPr>
+        <p:cNvPr id="1" name=""/>
+        <p:cNvGrpSpPr/>
+        <p:nvPr/>
+      </p:nvGrpSpPr>
+      <p:grpSpPr>
+        <a:xfrm>
+          <a:off x="0" y="0"/>
+          <a:ext cx="0" cy="0"/>
+          <a:chOff x="0" y="0"/>
+          <a:chExt cx="0" cy="0"/>
+        </a:xfrm>
+      </p:grpSpPr>
+      <p:sp>
+        <p:nvSpPr>
+          <p:cNvPr id="33" name="Slicer Panel Background">
+            <a:extLst>
+              <a:ext uri="{FF2B5EF4-FFF2-40B4-BE49-F238E27FC236}">
+                <a16:creationId xmlns:a16="http://schemas.microsoft.com/office/drawing/2014/main" id="{65536100-CA4D-75FB-4E79-36F3236061D4}"/>
+              </a:ext>
+            </a:extLst>
+          </p:cNvPr>
+          <p:cNvSpPr/>
+          <p:nvPr/>
+        </p:nvSpPr>
+        <p:spPr>
+          <a:xfrm>
+            <a:off x="1036891" y="559789"/>
+            <a:ext cx="9622700" cy="538817"/>
+          </a:xfrm>
+          <a:prstGeom prst="roundRect">
+            <a:avLst/>
+          </a:prstGeom>
+          <a:solidFill>
+            <a:schemeClr val="bg1"/>
+          </a:solidFill>
+          <a:ln>
+            <a:noFill/>
+          </a:ln>
+          <a:effectLst>
+            <a:outerShdw blurRad="50800" dist="38100" dir="5400000" algn="t" rotWithShape="0">
+              <a:prstClr val="black">
+                <a:alpha val="40000"/>
+              </a:prstClr>
+            </a:outerShdw>
+          </a:effectLst>
+        </p:spPr>
+        <p:style>
+          <a:lnRef idx="2">
+            <a:schemeClr val="accent1">
+              <a:shade val="15000"/>
+            </a:schemeClr>
+          </a:lnRef>
+          <a:fillRef idx="1">
+            <a:schemeClr val="accent1"/>
+          </a:fillRef>
+          <a:effectRef idx="0">
+            <a:schemeClr val="accent1"/>
+          </a:effectRef>
+          <a:fontRef idx="minor">
+            <a:schemeClr val="lt1"/>
+          </a:fontRef>
+        </p:style>
+        <p:txBody>
+          <a:bodyPr rtlCol="0" anchor="ctr"/>
+          <a:lstStyle/>
+          <a:p>
+            <a:pPr algn="ctr"/>
+            <a:endParaRPr lang="en-US"/>
+          </a:p>
+        </p:txBody>
+      </p:sp>
+      <p:sp>
+        <p:nvSpPr>
+          <p:cNvPr id="28" name="Title Bar">
+            <a:extLst>
+              <a:ext uri="{FF2B5EF4-FFF2-40B4-BE49-F238E27FC236}">
+                <a16:creationId xmlns:a16="http://schemas.microsoft.com/office/drawing/2014/main" id="{DF52F5A7-FD76-D141-0BA2-536B5B2088BB}"/>
+              </a:ext>
+            </a:extLst>
+          </p:cNvPr>
+          <p:cNvSpPr/>
+          <p:nvPr/>
+        </p:nvSpPr>
+        <p:spPr>
+          <a:xfrm>
+            <a:off x="44814" y="89340"/>
+            <a:ext cx="10614778" cy="365760"/>
+          </a:xfrm>
+          <a:prstGeom prst="rect">
+            <a:avLst/>
+          </a:prstGeom>
+          <a:solidFill>
+            <a:schemeClr val="bg1"/>
+          </a:solidFill>
+          <a:ln>
+            <a:noFill/>
+          </a:ln>
+        </p:spPr>
+        <p:style>
+          <a:lnRef idx="2">
+            <a:schemeClr val="accent1">
+              <a:shade val="15000"/>
+            </a:schemeClr>
+          </a:lnRef>
+          <a:fillRef idx="1">
+            <a:schemeClr val="accent1"/>
+          </a:fillRef>
+          <a:effectRef idx="0">
+            <a:schemeClr val="accent1"/>
+          </a:effectRef>
+          <a:fontRef idx="minor">
+            <a:schemeClr val="lt1"/>
+          </a:fontRef>
+        </p:style>
+        <p:txBody>
+          <a:bodyPr rtlCol="0" anchor="ctr"/>
+          <a:lstStyle/>
+          <a:p>
+            <a:pPr algn="ctr"/>
+            <a:endParaRPr lang="en-US"/>
+          </a:p>
+        </p:txBody>
+      </p:sp>
+      <p:sp>
+        <p:nvSpPr>
+          <p:cNvPr id="29" name="Dashboard Title Left Accent">
+            <a:extLst>
+              <a:ext uri="{FF2B5EF4-FFF2-40B4-BE49-F238E27FC236}">
+                <a16:creationId xmlns:a16="http://schemas.microsoft.com/office/drawing/2014/main" id="{C9A546F3-70CF-FA10-5E2F-E92985A80D82}"/>
+              </a:ext>
+            </a:extLst>
+          </p:cNvPr>
+          <p:cNvSpPr/>
+          <p:nvPr/>
+        </p:nvSpPr>
+        <p:spPr>
+          <a:xfrm>
+            <a:off x="44814" y="89340"/>
+            <a:ext cx="135485" cy="365760"/>
+          </a:xfrm>
+          <a:prstGeom prst="rect">
+            <a:avLst/>
+          </a:prstGeom>
+          <a:solidFill>
+            <a:srgbClr val="00B0F0"/>
+          </a:solidFill>
+          <a:ln>
+            <a:noFill/>
+          </a:ln>
+        </p:spPr>
+        <p:style>
+          <a:lnRef idx="2">
+            <a:schemeClr val="accent1">
+              <a:shade val="15000"/>
+            </a:schemeClr>
+          </a:lnRef>
+          <a:fillRef idx="1">
+            <a:schemeClr val="accent1"/>
+          </a:fillRef>
+          <a:effectRef idx="0">
+            <a:schemeClr val="accent1"/>
+          </a:effectRef>
+          <a:fontRef idx="minor">
+            <a:schemeClr val="lt1"/>
+          </a:fontRef>
+        </p:style>
+        <p:txBody>
+          <a:bodyPr rtlCol="0" anchor="ctr"/>
+          <a:lstStyle/>
+          <a:p>
+            <a:pPr algn="ctr"/>
+            <a:endParaRPr lang="en-US"/>
+          </a:p>
+        </p:txBody>
+      </p:sp>
+      <p:sp>
+        <p:nvSpPr>
+          <p:cNvPr id="30" name="Dashboard Title Bar Right Accent">
+            <a:extLst>
+              <a:ext uri="{FF2B5EF4-FFF2-40B4-BE49-F238E27FC236}">
+                <a16:creationId xmlns:a16="http://schemas.microsoft.com/office/drawing/2014/main" id="{583456BB-E255-CD32-1B89-33C9864B5F33}"/>
+              </a:ext>
+            </a:extLst>
+          </p:cNvPr>
+          <p:cNvSpPr/>
+          <p:nvPr/>
+        </p:nvSpPr>
+        <p:spPr>
+          <a:xfrm>
+            <a:off x="10524106" y="89340"/>
+            <a:ext cx="135485" cy="365760"/>
+          </a:xfrm>
+          <a:prstGeom prst="rect">
+            <a:avLst/>
+          </a:prstGeom>
+          <a:solidFill>
+            <a:srgbClr val="E01A8B"/>
+          </a:solidFill>
+          <a:ln>
+            <a:noFill/>
+          </a:ln>
+        </p:spPr>
+        <p:style>
+          <a:lnRef idx="2">
+            <a:schemeClr val="accent1">
+              <a:shade val="15000"/>
+            </a:schemeClr>
+          </a:lnRef>
+          <a:fillRef idx="1">
+            <a:schemeClr val="accent1"/>
+          </a:fillRef>
+          <a:effectRef idx="0">
+            <a:schemeClr val="accent1"/>
+          </a:effectRef>
+          <a:fontRef idx="minor">
+            <a:schemeClr val="lt1"/>
+          </a:fontRef>
+        </p:style>
+        <p:txBody>
+          <a:bodyPr rtlCol="0" anchor="ctr"/>
+          <a:lstStyle/>
+          <a:p>
+            <a:pPr algn="ctr"/>
+            <a:endParaRPr lang="en-US"/>
+          </a:p>
+        </p:txBody>
+      </p:sp>
+      <p:sp>
+        <p:nvSpPr>
+          <p:cNvPr id="31" name="Navigation Panel Left Side">
+            <a:extLst>
+              <a:ext uri="{FF2B5EF4-FFF2-40B4-BE49-F238E27FC236}">
+                <a16:creationId xmlns:a16="http://schemas.microsoft.com/office/drawing/2014/main" id="{FF42E2FC-A9C7-CA34-5EA0-AB6F50F2B446}"/>
+              </a:ext>
+            </a:extLst>
+          </p:cNvPr>
+          <p:cNvSpPr/>
+          <p:nvPr/>
+        </p:nvSpPr>
+        <p:spPr>
+          <a:xfrm>
+            <a:off x="44814" y="559788"/>
+            <a:ext cx="1458166" cy="5297212"/>
+          </a:xfrm>
+          <a:prstGeom prst="roundRect">
+            <a:avLst>
+              <a:gd name="adj" fmla="val 8300"/>
+            </a:avLst>
+          </a:prstGeom>
+          <a:solidFill>
+            <a:schemeClr val="bg1"/>
+          </a:solidFill>
+          <a:ln>
+            <a:noFill/>
+          </a:ln>
+          <a:effectLst>
+            <a:outerShdw blurRad="50800" dist="38100" dir="10800000" algn="r" rotWithShape="0">
+              <a:prstClr val="black">
+                <a:alpha val="40000"/>
+              </a:prstClr>
+            </a:outerShdw>
+          </a:effectLst>
+        </p:spPr>
+        <p:style>
+          <a:lnRef idx="2">
+            <a:schemeClr val="accent1">
+              <a:shade val="15000"/>
+            </a:schemeClr>
+          </a:lnRef>
+          <a:fillRef idx="1">
+            <a:schemeClr val="accent1"/>
+          </a:fillRef>
+          <a:effectRef idx="0">
+            <a:schemeClr val="accent1"/>
+          </a:effectRef>
+          <a:fontRef idx="minor">
+            <a:schemeClr val="lt1"/>
+          </a:fontRef>
+        </p:style>
+        <p:txBody>
+          <a:bodyPr rtlCol="0" anchor="ctr"/>
+          <a:lstStyle/>
+          <a:p>
+            <a:pPr algn="ctr"/>
+            <a:endParaRPr lang="en-US"/>
+          </a:p>
+        </p:txBody>
+      </p:sp>
+      <p:sp>
+        <p:nvSpPr>
+          <p:cNvPr id="32" name="Navigation Panel Right Side">
+            <a:extLst>
+              <a:ext uri="{FF2B5EF4-FFF2-40B4-BE49-F238E27FC236}">
+                <a16:creationId xmlns:a16="http://schemas.microsoft.com/office/drawing/2014/main" id="{0499EFA2-8BA3-E5AA-AA89-FEB09FBA66CE}"/>
+              </a:ext>
+            </a:extLst>
+          </p:cNvPr>
+          <p:cNvSpPr/>
+          <p:nvPr/>
+        </p:nvSpPr>
+        <p:spPr>
+          <a:xfrm>
+            <a:off x="966952" y="559788"/>
+            <a:ext cx="572262" cy="5297212"/>
+          </a:xfrm>
+          <a:prstGeom prst="roundRect">
+            <a:avLst/>
+          </a:prstGeom>
+          <a:solidFill>
+            <a:schemeClr val="bg1"/>
+          </a:solidFill>
+          <a:ln>
+            <a:noFill/>
+          </a:ln>
+          <a:effectLst/>
+        </p:spPr>
+        <p:style>
+          <a:lnRef idx="2">
+            <a:schemeClr val="accent1">
+              <a:shade val="15000"/>
+            </a:schemeClr>
+          </a:lnRef>
+          <a:fillRef idx="1">
+            <a:schemeClr val="accent1"/>
+          </a:fillRef>
+          <a:effectRef idx="0">
+            <a:schemeClr val="accent1"/>
+          </a:effectRef>
+          <a:fontRef idx="minor">
+            <a:schemeClr val="lt1"/>
+          </a:fontRef>
+        </p:style>
+        <p:txBody>
+          <a:bodyPr rtlCol="0" anchor="ctr"/>
+          <a:lstStyle/>
+          <a:p>
+            <a:pPr algn="ctr"/>
+            <a:endParaRPr lang="en-US"/>
+          </a:p>
+        </p:txBody>
+      </p:sp>
+      <p:sp>
+        <p:nvSpPr>
+          <p:cNvPr id="36" name="Address Card">
+            <a:extLst>
+              <a:ext uri="{FF2B5EF4-FFF2-40B4-BE49-F238E27FC236}">
+                <a16:creationId xmlns:a16="http://schemas.microsoft.com/office/drawing/2014/main" id="{125F922C-7925-92FC-8D9D-9FBCD1E762F4}"/>
+              </a:ext>
+            </a:extLst>
+          </p:cNvPr>
+          <p:cNvSpPr/>
+          <p:nvPr/>
+        </p:nvSpPr>
+        <p:spPr>
+          <a:xfrm>
+            <a:off x="3216166" y="1203295"/>
+            <a:ext cx="7443424" cy="2217822"/>
+          </a:xfrm>
+          <a:prstGeom prst="roundRect">
+            <a:avLst>
+              <a:gd name="adj" fmla="val 4164"/>
+            </a:avLst>
+          </a:prstGeom>
+          <a:solidFill>
+            <a:schemeClr val="bg1"/>
+          </a:solidFill>
+          <a:ln>
+            <a:noFill/>
+          </a:ln>
+        </p:spPr>
+        <p:style>
+          <a:lnRef idx="2">
+            <a:schemeClr val="accent1">
+              <a:shade val="15000"/>
+            </a:schemeClr>
+          </a:lnRef>
+          <a:fillRef idx="1">
+            <a:schemeClr val="accent1"/>
+          </a:fillRef>
+          <a:effectRef idx="0">
+            <a:schemeClr val="accent1"/>
+          </a:effectRef>
+          <a:fontRef idx="minor">
+            <a:schemeClr val="lt1"/>
+          </a:fontRef>
+        </p:style>
+        <p:txBody>
+          <a:bodyPr rtlCol="0" anchor="ctr"/>
+          <a:lstStyle/>
+          <a:p>
+            <a:pPr algn="ctr"/>
+            <a:endParaRPr lang="en-US"/>
+          </a:p>
+        </p:txBody>
+      </p:sp>
+      <p:sp>
+        <p:nvSpPr>
+          <p:cNvPr id="2" name="Rectangle: Rounded Corners 1">
+            <a:extLst>
+              <a:ext uri="{FF2B5EF4-FFF2-40B4-BE49-F238E27FC236}">
+                <a16:creationId xmlns:a16="http://schemas.microsoft.com/office/drawing/2014/main" id="{9AEC1336-5D1D-A787-B94A-C5EA527E8DE5}"/>
+              </a:ext>
+            </a:extLst>
+          </p:cNvPr>
+          <p:cNvSpPr/>
+          <p:nvPr/>
+        </p:nvSpPr>
+        <p:spPr>
+          <a:xfrm>
+            <a:off x="1671142" y="1272005"/>
+            <a:ext cx="1417320" cy="822960"/>
+          </a:xfrm>
+          <a:prstGeom prst="roundRect">
+            <a:avLst>
+              <a:gd name="adj" fmla="val 12277"/>
+            </a:avLst>
+          </a:prstGeom>
+          <a:solidFill>
+            <a:srgbClr val="7030A0"/>
+          </a:solidFill>
+          <a:ln>
+            <a:noFill/>
+          </a:ln>
+        </p:spPr>
+        <p:style>
+          <a:lnRef idx="2">
+            <a:schemeClr val="accent1">
+              <a:shade val="15000"/>
+            </a:schemeClr>
+          </a:lnRef>
+          <a:fillRef idx="1">
+            <a:schemeClr val="accent1"/>
+          </a:fillRef>
+          <a:effectRef idx="0">
+            <a:schemeClr val="accent1"/>
+          </a:effectRef>
+          <a:fontRef idx="minor">
+            <a:schemeClr val="lt1"/>
+          </a:fontRef>
+        </p:style>
+        <p:txBody>
+          <a:bodyPr rtlCol="0" anchor="ctr"/>
+          <a:lstStyle/>
+          <a:p>
+            <a:pPr algn="ctr"/>
+            <a:endParaRPr lang="en-US"/>
+          </a:p>
+        </p:txBody>
+      </p:sp>
+      <p:sp>
+        <p:nvSpPr>
+          <p:cNvPr id="3" name="Address Card">
+            <a:extLst>
+              <a:ext uri="{FF2B5EF4-FFF2-40B4-BE49-F238E27FC236}">
+                <a16:creationId xmlns:a16="http://schemas.microsoft.com/office/drawing/2014/main" id="{D3417DCE-D727-9D17-ADD2-86D5973B6065}"/>
+              </a:ext>
+            </a:extLst>
+          </p:cNvPr>
+          <p:cNvSpPr/>
+          <p:nvPr/>
+        </p:nvSpPr>
+        <p:spPr>
+          <a:xfrm>
+            <a:off x="3241675" y="3578771"/>
+            <a:ext cx="7443424" cy="2278229"/>
+          </a:xfrm>
+          <a:prstGeom prst="roundRect">
+            <a:avLst>
+              <a:gd name="adj" fmla="val 4164"/>
+            </a:avLst>
+          </a:prstGeom>
+          <a:solidFill>
+            <a:schemeClr val="bg1"/>
+          </a:solidFill>
+          <a:ln>
+            <a:noFill/>
+          </a:ln>
+        </p:spPr>
+        <p:style>
+          <a:lnRef idx="2">
+            <a:schemeClr val="accent1">
+              <a:shade val="15000"/>
+            </a:schemeClr>
+          </a:lnRef>
+          <a:fillRef idx="1">
+            <a:schemeClr val="accent1"/>
+          </a:fillRef>
+          <a:effectRef idx="0">
+            <a:schemeClr val="accent1"/>
+          </a:effectRef>
+          <a:fontRef idx="minor">
+            <a:schemeClr val="lt1"/>
+          </a:fontRef>
+        </p:style>
+        <p:txBody>
+          <a:bodyPr rtlCol="0" anchor="ctr"/>
+          <a:lstStyle/>
+          <a:p>
+            <a:pPr algn="ctr"/>
+            <a:endParaRPr lang="en-US"/>
+          </a:p>
+        </p:txBody>
+      </p:sp>
+    </p:spTree>
+    <p:extLst>
+      <p:ext uri="{BB962C8B-B14F-4D97-AF65-F5344CB8AC3E}">
+        <p14:creationId xmlns:p14="http://schemas.microsoft.com/office/powerpoint/2010/main" val="58485854"/>
       </p:ext>
     </p:extLst>
   </p:cSld>

</xml_diff>